<commit_message>
Update the atomics lecture
* Add incformation about the memory model
* Define the std::atomic template
* Provide an example checking for lock-free status of an atomic
</commit_message>
<xml_diff>
--- a/Lectures/Atomics/Atomics.pptx
+++ b/Lectures/Atomics/Atomics.pptx
@@ -5,7 +5,7 @@
     <p:sldMasterId id="2147483660" r:id="rId1"/>
   </p:sldMasterIdLst>
   <p:notesMasterIdLst>
-    <p:notesMasterId r:id="rId8"/>
+    <p:notesMasterId r:id="rId11"/>
   </p:notesMasterIdLst>
   <p:sldIdLst>
     <p:sldId id="256" r:id="rId2"/>
@@ -14,6 +14,9 @@
     <p:sldId id="260" r:id="rId5"/>
     <p:sldId id="261" r:id="rId6"/>
     <p:sldId id="262" r:id="rId7"/>
+    <p:sldId id="263" r:id="rId8"/>
+    <p:sldId id="264" r:id="rId9"/>
+    <p:sldId id="265" r:id="rId10"/>
   </p:sldIdLst>
   <p:sldSz cx="9144000" cy="6858000" type="screen4x3"/>
   <p:notesSz cx="6858000" cy="9144000"/>
@@ -197,7 +200,7 @@
           <a:p>
             <a:fld id="{DBE0ECA1-3FBF-48AE-AD2A-4439AE745E19}" type="datetimeFigureOut">
               <a:rPr lang="en-US" smtClean="0"/>
-              <a:t>12/5/2013</a:t>
+              <a:t>12/6/2013</a:t>
             </a:fld>
             <a:endParaRPr lang="en-US"/>
           </a:p>
@@ -658,7 +661,7 @@
           <a:p>
             <a:fld id="{9769DED8-28D4-45B9-A00F-7CFE9335FEA6}" type="datetime1">
               <a:rPr lang="en-US" smtClean="0"/>
-              <a:t>12/5/2013</a:t>
+              <a:t>12/6/2013</a:t>
             </a:fld>
             <a:endParaRPr lang="en-US"/>
           </a:p>
@@ -923,7 +926,7 @@
           <a:p>
             <a:fld id="{2DB3D439-1F88-44B4-B5F7-F9BCD4064257}" type="datetime1">
               <a:rPr lang="en-US" smtClean="0"/>
-              <a:t>12/5/2013</a:t>
+              <a:t>12/6/2013</a:t>
             </a:fld>
             <a:endParaRPr lang="en-US"/>
           </a:p>
@@ -1098,7 +1101,7 @@
           <a:p>
             <a:fld id="{99C5638F-6F55-4055-935C-67841BE78C36}" type="datetime1">
               <a:rPr lang="en-US" smtClean="0"/>
-              <a:t>12/5/2013</a:t>
+              <a:t>12/6/2013</a:t>
             </a:fld>
             <a:endParaRPr lang="en-US"/>
           </a:p>
@@ -1263,7 +1266,7 @@
           <a:p>
             <a:fld id="{E6987D90-0C92-4B22-A29D-FED15412CED2}" type="datetime1">
               <a:rPr lang="en-US" smtClean="0"/>
-              <a:t>12/5/2013</a:t>
+              <a:t>12/6/2013</a:t>
             </a:fld>
             <a:endParaRPr lang="en-US"/>
           </a:p>
@@ -1512,7 +1515,7 @@
           <a:p>
             <a:fld id="{DDB67BC4-9554-49E0-BCB3-D1EF965BA0B8}" type="datetime1">
               <a:rPr lang="en-US" smtClean="0"/>
-              <a:t>12/5/2013</a:t>
+              <a:t>12/6/2013</a:t>
             </a:fld>
             <a:endParaRPr lang="en-US"/>
           </a:p>
@@ -1795,7 +1798,7 @@
           <a:p>
             <a:fld id="{EC24D770-803D-4E01-921C-9C100DD8230C}" type="datetime1">
               <a:rPr lang="en-US" smtClean="0"/>
-              <a:t>12/5/2013</a:t>
+              <a:t>12/6/2013</a:t>
             </a:fld>
             <a:endParaRPr lang="en-US"/>
           </a:p>
@@ -2234,7 +2237,7 @@
           <a:p>
             <a:fld id="{356AD44B-78A4-4209-8070-7DCBE2DC4992}" type="datetime1">
               <a:rPr lang="en-US" smtClean="0"/>
-              <a:t>12/5/2013</a:t>
+              <a:t>12/6/2013</a:t>
             </a:fld>
             <a:endParaRPr lang="en-US"/>
           </a:p>
@@ -2347,7 +2350,7 @@
           <a:p>
             <a:fld id="{A993C59A-7CA2-467F-B7F1-9096881A01B8}" type="datetime1">
               <a:rPr lang="en-US" smtClean="0"/>
-              <a:t>12/5/2013</a:t>
+              <a:t>12/6/2013</a:t>
             </a:fld>
             <a:endParaRPr lang="en-US"/>
           </a:p>
@@ -2437,7 +2440,7 @@
           <a:p>
             <a:fld id="{2B6B58D0-2488-434A-8ED1-692E09B85CC5}" type="datetime1">
               <a:rPr lang="en-US" smtClean="0"/>
-              <a:t>12/5/2013</a:t>
+              <a:t>12/6/2013</a:t>
             </a:fld>
             <a:endParaRPr lang="en-US"/>
           </a:p>
@@ -2679,7 +2682,7 @@
           <a:p>
             <a:fld id="{FDB0AFC2-7D64-4F61-A7B7-9932D3305DDA}" type="datetime1">
               <a:rPr lang="en-US" smtClean="0"/>
-              <a:t>12/5/2013</a:t>
+              <a:t>12/6/2013</a:t>
             </a:fld>
             <a:endParaRPr lang="en-US"/>
           </a:p>
@@ -2973,7 +2976,7 @@
           <a:p>
             <a:fld id="{4983D17A-D7B2-4ECE-8A2C-93679B9D177B}" type="datetime1">
               <a:rPr lang="en-US" smtClean="0"/>
-              <a:t>12/5/2013</a:t>
+              <a:t>12/6/2013</a:t>
             </a:fld>
             <a:endParaRPr lang="en-US"/>
           </a:p>
@@ -3267,7 +3270,7 @@
           <a:p>
             <a:fld id="{2A5275F7-419E-4C23-8A3D-2EE5742B2EC9}" type="datetime1">
               <a:rPr lang="en-US" smtClean="0"/>
-              <a:t>12/5/2013</a:t>
+              <a:t>12/6/2013</a:t>
             </a:fld>
             <a:endParaRPr lang="en-US"/>
           </a:p>
@@ -5571,8 +5574,20 @@
             <a:pPr marL="800100" lvl="1" indent="-342900"/>
             <a:r>
               <a:rPr lang="en-US" dirty="0" smtClean="0"/>
-              <a:t>Atomic operations are more expensive then non-atomic operations</a:t>
-            </a:r>
+              <a:t>Atomic operations are more expensive then non-atomic </a:t>
+            </a:r>
+            <a:r>
+              <a:rPr lang="en-US" dirty="0" smtClean="0"/>
+              <a:t>operations</a:t>
+            </a:r>
+          </a:p>
+          <a:p>
+            <a:pPr marL="800100" lvl="1" indent="-342900"/>
+            <a:r>
+              <a:rPr lang="en-US" dirty="0" smtClean="0"/>
+              <a:t>Atomic operations occur on atomic types</a:t>
+            </a:r>
+            <a:endParaRPr lang="en-US" dirty="0" smtClean="0"/>
           </a:p>
           <a:p>
             <a:pPr marL="1485900" lvl="2" indent="-342900"/>
@@ -5599,6 +5614,29 @@
               <a:rPr lang="en-US" smtClean="0"/>
               <a:t>5</a:t>
             </a:fld>
+            <a:endParaRPr lang="en-US"/>
+          </a:p>
+        </p:txBody>
+      </p:sp>
+      <p:sp>
+        <p:nvSpPr>
+          <p:cNvPr id="5" name="Footer Placeholder 4"/>
+          <p:cNvSpPr>
+            <a:spLocks noGrp="1"/>
+          </p:cNvSpPr>
+          <p:nvPr>
+            <p:ph type="ftr" sz="quarter" idx="11"/>
+          </p:nvPr>
+        </p:nvSpPr>
+        <p:spPr/>
+        <p:txBody>
+          <a:bodyPr/>
+          <a:lstStyle/>
+          <a:p>
+            <a:r>
+              <a:rPr lang="en-US" smtClean="0"/>
+              <a:t>Source: Williams, Chapter 5</a:t>
+            </a:r>
             <a:endParaRPr lang="en-US"/>
           </a:p>
         </p:txBody>
@@ -5675,10 +5713,98 @@
         </p:nvSpPr>
         <p:spPr/>
         <p:txBody>
-          <a:bodyPr/>
-          <a:lstStyle/>
-          <a:p>
-            <a:endParaRPr lang="en-US"/>
+          <a:bodyPr>
+            <a:normAutofit lnSpcReduction="10000"/>
+          </a:bodyPr>
+          <a:lstStyle/>
+          <a:p>
+            <a:r>
+              <a:rPr lang="en-US" dirty="0" smtClean="0"/>
+              <a:t>The C++ standard defines a memory model for concurrency.</a:t>
+            </a:r>
+          </a:p>
+          <a:p>
+            <a:pPr marL="800100" lvl="1" indent="-342900"/>
+            <a:r>
+              <a:rPr lang="en-US" dirty="0" smtClean="0"/>
+              <a:t>An </a:t>
+            </a:r>
+            <a:r>
+              <a:rPr lang="en-US" i="1" dirty="0" smtClean="0"/>
+              <a:t>object</a:t>
+            </a:r>
+            <a:r>
+              <a:rPr lang="en-US" dirty="0" smtClean="0"/>
+              <a:t> is a region of storage</a:t>
+            </a:r>
+          </a:p>
+          <a:p>
+            <a:pPr marL="800100" lvl="1" indent="-342900"/>
+            <a:r>
+              <a:rPr lang="en-US" dirty="0" smtClean="0"/>
+              <a:t>Each object is stored in one or more memory locations</a:t>
+            </a:r>
+          </a:p>
+          <a:p>
+            <a:pPr marL="800100" lvl="1" indent="-342900"/>
+            <a:r>
+              <a:rPr lang="en-US" dirty="0" smtClean="0"/>
+              <a:t>An object may be divided into </a:t>
+            </a:r>
+            <a:r>
+              <a:rPr lang="en-US" dirty="0" err="1" smtClean="0"/>
+              <a:t>subobjects</a:t>
+            </a:r>
+            <a:endParaRPr lang="en-US" dirty="0" smtClean="0"/>
+          </a:p>
+          <a:p>
+            <a:pPr lvl="1" indent="0">
+              <a:buNone/>
+            </a:pPr>
+            <a:endParaRPr lang="en-US" dirty="0"/>
+          </a:p>
+          <a:p>
+            <a:r>
+              <a:rPr lang="en-US" dirty="0" smtClean="0"/>
+              <a:t>Four key concepts about objects</a:t>
+            </a:r>
+          </a:p>
+          <a:p>
+            <a:pPr lvl="1"/>
+            <a:r>
+              <a:rPr lang="en-US" dirty="0" smtClean="0"/>
+              <a:t>Every variable is an object, including those that are members of other objects</a:t>
+            </a:r>
+          </a:p>
+          <a:p>
+            <a:pPr lvl="1"/>
+            <a:r>
+              <a:rPr lang="en-US" dirty="0" smtClean="0"/>
+              <a:t>Every objects occupies at least one memory location</a:t>
+            </a:r>
+          </a:p>
+          <a:p>
+            <a:pPr lvl="1"/>
+            <a:r>
+              <a:rPr lang="en-US" dirty="0" smtClean="0"/>
+              <a:t>Variables of fundamental type (</a:t>
+            </a:r>
+            <a:r>
+              <a:rPr lang="en-US" dirty="0" err="1" smtClean="0"/>
+              <a:t>int</a:t>
+            </a:r>
+            <a:r>
+              <a:rPr lang="en-US" dirty="0" smtClean="0"/>
+              <a:t>, char, etc.) occupy exactly one memory location</a:t>
+            </a:r>
+          </a:p>
+          <a:p>
+            <a:pPr lvl="1"/>
+            <a:r>
+              <a:rPr lang="en-US" dirty="0" smtClean="0"/>
+              <a:t>Adjacent bit fields are part of the same memory location</a:t>
+            </a:r>
+            <a:endParaRPr lang="en-US" dirty="0"/>
           </a:p>
         </p:txBody>
       </p:sp>
@@ -5701,6 +5827,29 @@
               <a:rPr lang="en-US" smtClean="0"/>
               <a:t>6</a:t>
             </a:fld>
+            <a:endParaRPr lang="en-US"/>
+          </a:p>
+        </p:txBody>
+      </p:sp>
+      <p:sp>
+        <p:nvSpPr>
+          <p:cNvPr id="5" name="Footer Placeholder 4"/>
+          <p:cNvSpPr>
+            <a:spLocks noGrp="1"/>
+          </p:cNvSpPr>
+          <p:nvPr>
+            <p:ph type="ftr" sz="quarter" idx="11"/>
+          </p:nvPr>
+        </p:nvSpPr>
+        <p:spPr/>
+        <p:txBody>
+          <a:bodyPr/>
+          <a:lstStyle/>
+          <a:p>
+            <a:r>
+              <a:rPr lang="en-US" smtClean="0"/>
+              <a:t>Source: Williams, Chapter 5</a:t>
+            </a:r>
             <a:endParaRPr lang="en-US"/>
           </a:p>
         </p:txBody>
@@ -5722,6 +5871,728 @@
       </p:par>
     </p:tnLst>
   </p:timing>
+</p:sld>
+</file>
+
+<file path=ppt/slides/slide7.xml><?xml version="1.0" encoding="utf-8"?>
+<p:sld xmlns:a="http://schemas.openxmlformats.org/drawingml/2006/main" xmlns:r="http://schemas.openxmlformats.org/officeDocument/2006/relationships" xmlns:p="http://schemas.openxmlformats.org/presentationml/2006/main">
+  <p:cSld>
+    <p:spTree>
+      <p:nvGrpSpPr>
+        <p:cNvPr id="1" name=""/>
+        <p:cNvGrpSpPr/>
+        <p:nvPr/>
+      </p:nvGrpSpPr>
+      <p:grpSpPr>
+        <a:xfrm>
+          <a:off x="0" y="0"/>
+          <a:ext cx="0" cy="0"/>
+          <a:chOff x="0" y="0"/>
+          <a:chExt cx="0" cy="0"/>
+        </a:xfrm>
+      </p:grpSpPr>
+      <p:sp>
+        <p:nvSpPr>
+          <p:cNvPr id="2" name="Title 1"/>
+          <p:cNvSpPr>
+            <a:spLocks noGrp="1"/>
+          </p:cNvSpPr>
+          <p:nvPr>
+            <p:ph type="title"/>
+          </p:nvPr>
+        </p:nvSpPr>
+        <p:spPr/>
+        <p:txBody>
+          <a:bodyPr/>
+          <a:lstStyle/>
+          <a:p>
+            <a:r>
+              <a:rPr lang="en-US" dirty="0" smtClean="0"/>
+              <a:t>data races</a:t>
+            </a:r>
+            <a:endParaRPr lang="en-US" dirty="0"/>
+          </a:p>
+        </p:txBody>
+      </p:sp>
+      <p:sp>
+        <p:nvSpPr>
+          <p:cNvPr id="3" name="Content Placeholder 2"/>
+          <p:cNvSpPr>
+            <a:spLocks noGrp="1"/>
+          </p:cNvSpPr>
+          <p:nvPr>
+            <p:ph idx="1"/>
+          </p:nvPr>
+        </p:nvSpPr>
+        <p:spPr/>
+        <p:txBody>
+          <a:bodyPr/>
+          <a:lstStyle/>
+          <a:p>
+            <a:r>
+              <a:rPr lang="en-US" dirty="0" smtClean="0"/>
+              <a:t>A </a:t>
+            </a:r>
+            <a:r>
+              <a:rPr lang="en-US" i="1" dirty="0" smtClean="0"/>
+              <a:t>data race</a:t>
+            </a:r>
+            <a:r>
+              <a:rPr lang="en-US" dirty="0" smtClean="0"/>
+              <a:t> occurs when all of these conditions apply:</a:t>
+            </a:r>
+          </a:p>
+          <a:p>
+            <a:pPr marL="914400" lvl="1" indent="-457200">
+              <a:buFont typeface="+mj-lt"/>
+              <a:buAutoNum type="arabicPeriod"/>
+            </a:pPr>
+            <a:r>
+              <a:rPr lang="en-US" dirty="0" smtClean="0"/>
+              <a:t>Two or more threads access the same memory location</a:t>
+            </a:r>
+          </a:p>
+          <a:p>
+            <a:pPr marL="914400" lvl="1" indent="-457200">
+              <a:buFont typeface="+mj-lt"/>
+              <a:buAutoNum type="arabicPeriod"/>
+            </a:pPr>
+            <a:r>
+              <a:rPr lang="en-US" dirty="0" smtClean="0"/>
+              <a:t>One or both of these accesses is not atomic</a:t>
+            </a:r>
+          </a:p>
+          <a:p>
+            <a:pPr marL="914400" lvl="1" indent="-457200">
+              <a:buFont typeface="+mj-lt"/>
+              <a:buAutoNum type="arabicPeriod"/>
+            </a:pPr>
+            <a:r>
+              <a:rPr lang="en-US" dirty="0" smtClean="0"/>
+              <a:t>One of both of these accesses is a write</a:t>
+            </a:r>
+          </a:p>
+          <a:p>
+            <a:pPr marL="342900" indent="-342900"/>
+            <a:r>
+              <a:rPr lang="en-US" dirty="0" smtClean="0"/>
+              <a:t>A data race is undefined behavior – avoid it at all costs!</a:t>
+            </a:r>
+          </a:p>
+          <a:p>
+            <a:pPr marL="342900" indent="-342900"/>
+            <a:r>
+              <a:rPr lang="en-US" dirty="0" smtClean="0"/>
+              <a:t>Preventing a data race, do one of the following</a:t>
+            </a:r>
+          </a:p>
+          <a:p>
+            <a:pPr marL="800100" lvl="1" indent="-342900"/>
+            <a:r>
+              <a:rPr lang="en-US" dirty="0" smtClean="0"/>
+              <a:t>Use a mutex to allow only one thread to access</a:t>
+            </a:r>
+          </a:p>
+          <a:p>
+            <a:pPr marL="800100" lvl="1" indent="-342900"/>
+            <a:r>
+              <a:rPr lang="en-US" dirty="0" smtClean="0"/>
+              <a:t>Use atomic operations in all threads to access</a:t>
+            </a:r>
+          </a:p>
+          <a:p>
+            <a:pPr marL="800100" lvl="1" indent="-342900"/>
+            <a:r>
+              <a:rPr lang="en-US" dirty="0" smtClean="0"/>
+              <a:t>Do not write the data, access it for reads only</a:t>
+            </a:r>
+          </a:p>
+          <a:p>
+            <a:pPr marL="800100" lvl="1" indent="-342900"/>
+            <a:endParaRPr lang="en-US" dirty="0" smtClean="0"/>
+          </a:p>
+          <a:p>
+            <a:pPr marL="800100" lvl="1" indent="-342900"/>
+            <a:endParaRPr lang="en-US" dirty="0"/>
+          </a:p>
+        </p:txBody>
+      </p:sp>
+      <p:sp>
+        <p:nvSpPr>
+          <p:cNvPr id="4" name="Slide Number Placeholder 3"/>
+          <p:cNvSpPr>
+            <a:spLocks noGrp="1"/>
+          </p:cNvSpPr>
+          <p:nvPr>
+            <p:ph type="sldNum" sz="quarter" idx="12"/>
+          </p:nvPr>
+        </p:nvSpPr>
+        <p:spPr/>
+        <p:txBody>
+          <a:bodyPr/>
+          <a:lstStyle/>
+          <a:p>
+            <a:fld id="{6DA12B36-9664-4CB0-8B2E-F4A2F44AE97E}" type="slidenum">
+              <a:rPr lang="en-US" smtClean="0"/>
+              <a:t>7</a:t>
+            </a:fld>
+            <a:endParaRPr lang="en-US"/>
+          </a:p>
+        </p:txBody>
+      </p:sp>
+      <p:sp>
+        <p:nvSpPr>
+          <p:cNvPr id="5" name="Footer Placeholder 4"/>
+          <p:cNvSpPr>
+            <a:spLocks noGrp="1"/>
+          </p:cNvSpPr>
+          <p:nvPr>
+            <p:ph type="ftr" sz="quarter" idx="11"/>
+          </p:nvPr>
+        </p:nvSpPr>
+        <p:spPr/>
+        <p:txBody>
+          <a:bodyPr/>
+          <a:lstStyle/>
+          <a:p>
+            <a:r>
+              <a:rPr lang="en-US" smtClean="0"/>
+              <a:t>Source: Williams, Chapter 5</a:t>
+            </a:r>
+            <a:endParaRPr lang="en-US"/>
+          </a:p>
+        </p:txBody>
+      </p:sp>
+    </p:spTree>
+    <p:extLst>
+      <p:ext uri="{BB962C8B-B14F-4D97-AF65-F5344CB8AC3E}">
+        <p14:creationId xmlns:p14="http://schemas.microsoft.com/office/powerpoint/2010/main" val="3274783395"/>
+      </p:ext>
+    </p:extLst>
+  </p:cSld>
+  <p:clrMapOvr>
+    <a:masterClrMapping/>
+  </p:clrMapOvr>
+</p:sld>
+</file>
+
+<file path=ppt/slides/slide8.xml><?xml version="1.0" encoding="utf-8"?>
+<p:sld xmlns:a="http://schemas.openxmlformats.org/drawingml/2006/main" xmlns:r="http://schemas.openxmlformats.org/officeDocument/2006/relationships" xmlns:p="http://schemas.openxmlformats.org/presentationml/2006/main">
+  <p:cSld>
+    <p:spTree>
+      <p:nvGrpSpPr>
+        <p:cNvPr id="1" name=""/>
+        <p:cNvGrpSpPr/>
+        <p:nvPr/>
+      </p:nvGrpSpPr>
+      <p:grpSpPr>
+        <a:xfrm>
+          <a:off x="0" y="0"/>
+          <a:ext cx="0" cy="0"/>
+          <a:chOff x="0" y="0"/>
+          <a:chExt cx="0" cy="0"/>
+        </a:xfrm>
+      </p:grpSpPr>
+      <p:sp>
+        <p:nvSpPr>
+          <p:cNvPr id="2" name="Title 1"/>
+          <p:cNvSpPr>
+            <a:spLocks noGrp="1"/>
+          </p:cNvSpPr>
+          <p:nvPr>
+            <p:ph type="title"/>
+          </p:nvPr>
+        </p:nvSpPr>
+        <p:spPr/>
+        <p:txBody>
+          <a:bodyPr/>
+          <a:lstStyle/>
+          <a:p>
+            <a:r>
+              <a:rPr lang="en-US" dirty="0" smtClean="0"/>
+              <a:t>Modification Order</a:t>
+            </a:r>
+            <a:endParaRPr lang="en-US" dirty="0"/>
+          </a:p>
+        </p:txBody>
+      </p:sp>
+      <p:sp>
+        <p:nvSpPr>
+          <p:cNvPr id="3" name="Content Placeholder 2"/>
+          <p:cNvSpPr>
+            <a:spLocks noGrp="1"/>
+          </p:cNvSpPr>
+          <p:nvPr>
+            <p:ph idx="1"/>
+          </p:nvPr>
+        </p:nvSpPr>
+        <p:spPr/>
+        <p:txBody>
+          <a:bodyPr/>
+          <a:lstStyle/>
+          <a:p>
+            <a:r>
+              <a:rPr lang="en-US" dirty="0" smtClean="0"/>
+              <a:t>Every object in a C++ program has a </a:t>
+            </a:r>
+            <a:r>
+              <a:rPr lang="en-US" i="1" dirty="0" smtClean="0"/>
+              <a:t>modification order</a:t>
+            </a:r>
+            <a:endParaRPr lang="en-US" dirty="0" smtClean="0"/>
+          </a:p>
+          <a:p>
+            <a:pPr marL="800100" lvl="1" indent="-342900"/>
+            <a:r>
+              <a:rPr lang="en-US" dirty="0" smtClean="0"/>
+              <a:t>The order writes are applied to that object by all threads</a:t>
+            </a:r>
+          </a:p>
+          <a:p>
+            <a:pPr marL="800100" lvl="1" indent="-342900"/>
+            <a:r>
+              <a:rPr lang="en-US" dirty="0" smtClean="0"/>
+              <a:t>All threads should agree on this order, or problems will occur</a:t>
+            </a:r>
+          </a:p>
+          <a:p>
+            <a:pPr marL="800100" lvl="1" indent="-342900"/>
+            <a:r>
+              <a:rPr lang="en-US" dirty="0" smtClean="0"/>
+              <a:t>How do we enforce this order across all threads?</a:t>
+            </a:r>
+          </a:p>
+          <a:p>
+            <a:pPr marL="1485900" lvl="2" indent="-342900"/>
+            <a:r>
+              <a:rPr lang="en-US" dirty="0" smtClean="0"/>
+              <a:t>Developer synchronization – mutexes</a:t>
+            </a:r>
+          </a:p>
+          <a:p>
+            <a:pPr marL="1485900" lvl="2" indent="-342900"/>
+            <a:r>
+              <a:rPr lang="en-US" dirty="0" smtClean="0"/>
+              <a:t>Compilers synchronization – atomics</a:t>
+            </a:r>
+          </a:p>
+          <a:p>
+            <a:pPr marL="342900" indent="-342900"/>
+            <a:endParaRPr lang="en-US" dirty="0"/>
+          </a:p>
+          <a:p>
+            <a:pPr marL="342900" indent="-342900"/>
+            <a:r>
+              <a:rPr lang="en-US" dirty="0" smtClean="0"/>
+              <a:t>Atomics may not prevent a race condition</a:t>
+            </a:r>
+          </a:p>
+          <a:p>
+            <a:pPr marL="800100" lvl="1" indent="-342900"/>
+            <a:r>
+              <a:rPr lang="en-US" dirty="0" smtClean="0"/>
+              <a:t>The modification order may change run to run</a:t>
+            </a:r>
+          </a:p>
+          <a:p>
+            <a:pPr marL="800100" lvl="1" indent="-342900"/>
+            <a:r>
+              <a:rPr lang="en-US" dirty="0" smtClean="0"/>
+              <a:t>A data race, and undefined behavior, will not occur</a:t>
+            </a:r>
+            <a:endParaRPr lang="en-US" dirty="0"/>
+          </a:p>
+        </p:txBody>
+      </p:sp>
+      <p:sp>
+        <p:nvSpPr>
+          <p:cNvPr id="4" name="Slide Number Placeholder 3"/>
+          <p:cNvSpPr>
+            <a:spLocks noGrp="1"/>
+          </p:cNvSpPr>
+          <p:nvPr>
+            <p:ph type="sldNum" sz="quarter" idx="12"/>
+          </p:nvPr>
+        </p:nvSpPr>
+        <p:spPr/>
+        <p:txBody>
+          <a:bodyPr/>
+          <a:lstStyle/>
+          <a:p>
+            <a:fld id="{6DA12B36-9664-4CB0-8B2E-F4A2F44AE97E}" type="slidenum">
+              <a:rPr lang="en-US" smtClean="0"/>
+              <a:t>8</a:t>
+            </a:fld>
+            <a:endParaRPr lang="en-US"/>
+          </a:p>
+        </p:txBody>
+      </p:sp>
+    </p:spTree>
+    <p:extLst>
+      <p:ext uri="{BB962C8B-B14F-4D97-AF65-F5344CB8AC3E}">
+        <p14:creationId xmlns:p14="http://schemas.microsoft.com/office/powerpoint/2010/main" val="3824690255"/>
+      </p:ext>
+    </p:extLst>
+  </p:cSld>
+  <p:clrMapOvr>
+    <a:masterClrMapping/>
+  </p:clrMapOvr>
+</p:sld>
+</file>
+
+<file path=ppt/slides/slide9.xml><?xml version="1.0" encoding="utf-8"?>
+<p:sld xmlns:a="http://schemas.openxmlformats.org/drawingml/2006/main" xmlns:r="http://schemas.openxmlformats.org/officeDocument/2006/relationships" xmlns:p="http://schemas.openxmlformats.org/presentationml/2006/main">
+  <p:cSld>
+    <p:spTree>
+      <p:nvGrpSpPr>
+        <p:cNvPr id="1" name=""/>
+        <p:cNvGrpSpPr/>
+        <p:nvPr/>
+      </p:nvGrpSpPr>
+      <p:grpSpPr>
+        <a:xfrm>
+          <a:off x="0" y="0"/>
+          <a:ext cx="0" cy="0"/>
+          <a:chOff x="0" y="0"/>
+          <a:chExt cx="0" cy="0"/>
+        </a:xfrm>
+      </p:grpSpPr>
+      <p:sp>
+        <p:nvSpPr>
+          <p:cNvPr id="2" name="Title 1"/>
+          <p:cNvSpPr>
+            <a:spLocks noGrp="1"/>
+          </p:cNvSpPr>
+          <p:nvPr>
+            <p:ph type="title"/>
+          </p:nvPr>
+        </p:nvSpPr>
+        <p:spPr/>
+        <p:txBody>
+          <a:bodyPr/>
+          <a:lstStyle/>
+          <a:p>
+            <a:r>
+              <a:rPr lang="en-US" dirty="0" smtClean="0"/>
+              <a:t>Atomic types</a:t>
+            </a:r>
+            <a:endParaRPr lang="en-US" dirty="0"/>
+          </a:p>
+        </p:txBody>
+      </p:sp>
+      <p:sp>
+        <p:nvSpPr>
+          <p:cNvPr id="3" name="Content Placeholder 2"/>
+          <p:cNvSpPr>
+            <a:spLocks noGrp="1"/>
+          </p:cNvSpPr>
+          <p:nvPr>
+            <p:ph idx="1"/>
+          </p:nvPr>
+        </p:nvSpPr>
+        <p:spPr/>
+        <p:txBody>
+          <a:bodyPr>
+            <a:normAutofit fontScale="92500"/>
+          </a:bodyPr>
+          <a:lstStyle/>
+          <a:p>
+            <a:r>
+              <a:rPr lang="en-US" dirty="0" smtClean="0"/>
+              <a:t>C++ defines a template named </a:t>
+            </a:r>
+            <a:r>
+              <a:rPr lang="en-US" dirty="0" err="1" smtClean="0">
+                <a:latin typeface="Courier New" panose="02070309020205020404" pitchFamily="49" charset="0"/>
+                <a:cs typeface="Courier New" panose="02070309020205020404" pitchFamily="49" charset="0"/>
+              </a:rPr>
+              <a:t>std</a:t>
+            </a:r>
+            <a:r>
+              <a:rPr lang="en-US" dirty="0" smtClean="0">
+                <a:latin typeface="Courier New" panose="02070309020205020404" pitchFamily="49" charset="0"/>
+                <a:cs typeface="Courier New" panose="02070309020205020404" pitchFamily="49" charset="0"/>
+              </a:rPr>
+              <a:t>::atomic&lt;&gt;</a:t>
+            </a:r>
+            <a:endParaRPr lang="en-US" dirty="0" smtClean="0">
+              <a:cs typeface="Courier New" panose="02070309020205020404" pitchFamily="49" charset="0"/>
+            </a:endParaRPr>
+          </a:p>
+          <a:p>
+            <a:pPr marL="800100" lvl="1" indent="-342900"/>
+            <a:r>
+              <a:rPr lang="en-US" dirty="0" smtClean="0">
+                <a:cs typeface="Courier New" panose="02070309020205020404" pitchFamily="49" charset="0"/>
+              </a:rPr>
+              <a:t>Provides specializations for built-in types</a:t>
+            </a:r>
+          </a:p>
+          <a:p>
+            <a:pPr marL="1485900" lvl="2" indent="-342900"/>
+            <a:r>
+              <a:rPr lang="en-US" dirty="0" err="1">
+                <a:latin typeface="Courier New" panose="02070309020205020404" pitchFamily="49" charset="0"/>
+                <a:cs typeface="Courier New" panose="02070309020205020404" pitchFamily="49" charset="0"/>
+              </a:rPr>
+              <a:t>s</a:t>
+            </a:r>
+            <a:r>
+              <a:rPr lang="en-US" dirty="0" err="1" smtClean="0">
+                <a:latin typeface="Courier New" panose="02070309020205020404" pitchFamily="49" charset="0"/>
+                <a:cs typeface="Courier New" panose="02070309020205020404" pitchFamily="49" charset="0"/>
+              </a:rPr>
+              <a:t>td</a:t>
+            </a:r>
+            <a:r>
+              <a:rPr lang="en-US" dirty="0" smtClean="0">
+                <a:latin typeface="Courier New" panose="02070309020205020404" pitchFamily="49" charset="0"/>
+                <a:cs typeface="Courier New" panose="02070309020205020404" pitchFamily="49" charset="0"/>
+              </a:rPr>
+              <a:t>::atomic&lt;</a:t>
+            </a:r>
+            <a:r>
+              <a:rPr lang="en-US" dirty="0" err="1" smtClean="0">
+                <a:latin typeface="Courier New" panose="02070309020205020404" pitchFamily="49" charset="0"/>
+                <a:cs typeface="Courier New" panose="02070309020205020404" pitchFamily="49" charset="0"/>
+              </a:rPr>
+              <a:t>bool</a:t>
+            </a:r>
+            <a:r>
+              <a:rPr lang="en-US" dirty="0" smtClean="0">
+                <a:latin typeface="Courier New" panose="02070309020205020404" pitchFamily="49" charset="0"/>
+                <a:cs typeface="Courier New" panose="02070309020205020404" pitchFamily="49" charset="0"/>
+              </a:rPr>
+              <a:t>&gt;</a:t>
+            </a:r>
+          </a:p>
+          <a:p>
+            <a:pPr marL="1485900" lvl="2" indent="-342900"/>
+            <a:r>
+              <a:rPr lang="en-US" dirty="0" err="1">
+                <a:latin typeface="Courier New" panose="02070309020205020404" pitchFamily="49" charset="0"/>
+                <a:cs typeface="Courier New" panose="02070309020205020404" pitchFamily="49" charset="0"/>
+              </a:rPr>
+              <a:t>s</a:t>
+            </a:r>
+            <a:r>
+              <a:rPr lang="en-US" dirty="0" err="1" smtClean="0">
+                <a:latin typeface="Courier New" panose="02070309020205020404" pitchFamily="49" charset="0"/>
+                <a:cs typeface="Courier New" panose="02070309020205020404" pitchFamily="49" charset="0"/>
+              </a:rPr>
+              <a:t>td</a:t>
+            </a:r>
+            <a:r>
+              <a:rPr lang="en-US" dirty="0" smtClean="0">
+                <a:latin typeface="Courier New" panose="02070309020205020404" pitchFamily="49" charset="0"/>
+                <a:cs typeface="Courier New" panose="02070309020205020404" pitchFamily="49" charset="0"/>
+              </a:rPr>
+              <a:t>::atomic&lt;</a:t>
+            </a:r>
+            <a:r>
+              <a:rPr lang="en-US" dirty="0" err="1" smtClean="0">
+                <a:latin typeface="Courier New" panose="02070309020205020404" pitchFamily="49" charset="0"/>
+                <a:cs typeface="Courier New" panose="02070309020205020404" pitchFamily="49" charset="0"/>
+              </a:rPr>
+              <a:t>int</a:t>
+            </a:r>
+            <a:r>
+              <a:rPr lang="en-US" dirty="0" smtClean="0">
+                <a:latin typeface="Courier New" panose="02070309020205020404" pitchFamily="49" charset="0"/>
+                <a:cs typeface="Courier New" panose="02070309020205020404" pitchFamily="49" charset="0"/>
+              </a:rPr>
+              <a:t>&gt;</a:t>
+            </a:r>
+          </a:p>
+          <a:p>
+            <a:pPr marL="1485900" lvl="2" indent="-342900"/>
+            <a:r>
+              <a:rPr lang="en-US" dirty="0" err="1">
+                <a:latin typeface="Courier New" panose="02070309020205020404" pitchFamily="49" charset="0"/>
+                <a:cs typeface="Courier New" panose="02070309020205020404" pitchFamily="49" charset="0"/>
+              </a:rPr>
+              <a:t>s</a:t>
+            </a:r>
+            <a:r>
+              <a:rPr lang="en-US" dirty="0" err="1" smtClean="0">
+                <a:latin typeface="Courier New" panose="02070309020205020404" pitchFamily="49" charset="0"/>
+                <a:cs typeface="Courier New" panose="02070309020205020404" pitchFamily="49" charset="0"/>
+              </a:rPr>
+              <a:t>td</a:t>
+            </a:r>
+            <a:r>
+              <a:rPr lang="en-US" dirty="0" smtClean="0">
+                <a:latin typeface="Courier New" panose="02070309020205020404" pitchFamily="49" charset="0"/>
+                <a:cs typeface="Courier New" panose="02070309020205020404" pitchFamily="49" charset="0"/>
+              </a:rPr>
+              <a:t>::atomic&lt;char&gt;, </a:t>
+            </a:r>
+            <a:r>
+              <a:rPr lang="en-US" dirty="0" smtClean="0">
+                <a:cs typeface="Courier New" panose="02070309020205020404" pitchFamily="49" charset="0"/>
+              </a:rPr>
+              <a:t>etc.</a:t>
+            </a:r>
+          </a:p>
+          <a:p>
+            <a:pPr marL="800100" lvl="1" indent="-342900"/>
+            <a:r>
+              <a:rPr lang="en-US" dirty="0" smtClean="0">
+                <a:cs typeface="Courier New" panose="02070309020205020404" pitchFamily="49" charset="0"/>
+              </a:rPr>
+              <a:t>Allows user-defined types to be used as atomics</a:t>
+            </a:r>
+          </a:p>
+          <a:p>
+            <a:pPr marL="342900" indent="-342900"/>
+            <a:r>
+              <a:rPr lang="en-US" dirty="0" smtClean="0">
+                <a:cs typeface="Courier New" panose="02070309020205020404" pitchFamily="49" charset="0"/>
+              </a:rPr>
+              <a:t>Atomic types have a few interesting properties</a:t>
+            </a:r>
+          </a:p>
+          <a:p>
+            <a:pPr marL="800100" lvl="1" indent="-342900"/>
+            <a:r>
+              <a:rPr lang="en-US" dirty="0" smtClean="0">
+                <a:cs typeface="Courier New" panose="02070309020205020404" pitchFamily="49" charset="0"/>
+              </a:rPr>
+              <a:t>Not </a:t>
+            </a:r>
+            <a:r>
+              <a:rPr lang="en-US" dirty="0" err="1" smtClean="0">
+                <a:cs typeface="Courier New" panose="02070309020205020404" pitchFamily="49" charset="0"/>
+              </a:rPr>
+              <a:t>copyable</a:t>
+            </a:r>
+            <a:endParaRPr lang="en-US" dirty="0" smtClean="0">
+              <a:cs typeface="Courier New" panose="02070309020205020404" pitchFamily="49" charset="0"/>
+            </a:endParaRPr>
+          </a:p>
+          <a:p>
+            <a:pPr marL="800100" lvl="1" indent="-342900"/>
+            <a:r>
+              <a:rPr lang="en-US" dirty="0" smtClean="0">
+                <a:cs typeface="Courier New" panose="02070309020205020404" pitchFamily="49" charset="0"/>
+              </a:rPr>
+              <a:t>Not assignable (in the normal sense)</a:t>
+            </a:r>
+          </a:p>
+          <a:p>
+            <a:pPr marL="800100" lvl="1" indent="-342900"/>
+            <a:r>
+              <a:rPr lang="en-US" dirty="0" smtClean="0">
+                <a:cs typeface="Courier New" panose="02070309020205020404" pitchFamily="49" charset="0"/>
+              </a:rPr>
+              <a:t>Have explicit </a:t>
+            </a:r>
+            <a:r>
+              <a:rPr lang="en-US" dirty="0" smtClean="0">
+                <a:latin typeface="Courier New" panose="02070309020205020404" pitchFamily="49" charset="0"/>
+                <a:cs typeface="Courier New" panose="02070309020205020404" pitchFamily="49" charset="0"/>
+              </a:rPr>
+              <a:t>load</a:t>
+            </a:r>
+            <a:r>
+              <a:rPr lang="en-US" dirty="0" smtClean="0">
+                <a:cs typeface="Courier New" panose="02070309020205020404" pitchFamily="49" charset="0"/>
+              </a:rPr>
+              <a:t> (read) and </a:t>
+            </a:r>
+            <a:r>
+              <a:rPr lang="en-US" dirty="0" smtClean="0">
+                <a:latin typeface="Courier New" panose="02070309020205020404" pitchFamily="49" charset="0"/>
+                <a:cs typeface="Courier New" panose="02070309020205020404" pitchFamily="49" charset="0"/>
+              </a:rPr>
+              <a:t>store</a:t>
+            </a:r>
+            <a:r>
+              <a:rPr lang="en-US" dirty="0" smtClean="0">
+                <a:cs typeface="Courier New" panose="02070309020205020404" pitchFamily="49" charset="0"/>
+              </a:rPr>
+              <a:t> (write) methods</a:t>
+            </a:r>
+          </a:p>
+          <a:p>
+            <a:pPr marL="800100" lvl="1" indent="-342900"/>
+            <a:r>
+              <a:rPr lang="en-US" dirty="0" smtClean="0">
+                <a:cs typeface="Courier New" panose="02070309020205020404" pitchFamily="49" charset="0"/>
+              </a:rPr>
+              <a:t>Support read-modify-write operations via </a:t>
+            </a:r>
+            <a:r>
+              <a:rPr lang="en-US" dirty="0" smtClean="0">
+                <a:latin typeface="Courier New" panose="02070309020205020404" pitchFamily="49" charset="0"/>
+                <a:cs typeface="Courier New" panose="02070309020205020404" pitchFamily="49" charset="0"/>
+              </a:rPr>
+              <a:t>exchange</a:t>
+            </a:r>
+            <a:r>
+              <a:rPr lang="en-US" dirty="0" smtClean="0">
+                <a:cs typeface="Courier New" panose="02070309020205020404" pitchFamily="49" charset="0"/>
+              </a:rPr>
+              <a:t> methods</a:t>
+            </a:r>
+          </a:p>
+          <a:p>
+            <a:pPr marL="800100" lvl="1" indent="-342900"/>
+            <a:r>
+              <a:rPr lang="en-US" dirty="0" smtClean="0">
+                <a:cs typeface="Courier New" panose="02070309020205020404" pitchFamily="49" charset="0"/>
+              </a:rPr>
+              <a:t>Maybe implemented without locks, </a:t>
+            </a:r>
+            <a:r>
+              <a:rPr lang="en-US" dirty="0" err="1" smtClean="0">
+                <a:latin typeface="Courier New" panose="02070309020205020404" pitchFamily="49" charset="0"/>
+                <a:cs typeface="Courier New" panose="02070309020205020404" pitchFamily="49" charset="0"/>
+              </a:rPr>
+              <a:t>is_lock_free</a:t>
+            </a:r>
+            <a:r>
+              <a:rPr lang="en-US" dirty="0" smtClean="0">
+                <a:cs typeface="Courier New" panose="02070309020205020404" pitchFamily="49" charset="0"/>
+              </a:rPr>
+              <a:t> method</a:t>
+            </a:r>
+          </a:p>
+        </p:txBody>
+      </p:sp>
+      <p:sp>
+        <p:nvSpPr>
+          <p:cNvPr id="4" name="Slide Number Placeholder 3"/>
+          <p:cNvSpPr>
+            <a:spLocks noGrp="1"/>
+          </p:cNvSpPr>
+          <p:nvPr>
+            <p:ph type="sldNum" sz="quarter" idx="12"/>
+          </p:nvPr>
+        </p:nvSpPr>
+        <p:spPr/>
+        <p:txBody>
+          <a:bodyPr/>
+          <a:lstStyle/>
+          <a:p>
+            <a:fld id="{6DA12B36-9664-4CB0-8B2E-F4A2F44AE97E}" type="slidenum">
+              <a:rPr lang="en-US" smtClean="0"/>
+              <a:t>9</a:t>
+            </a:fld>
+            <a:endParaRPr lang="en-US"/>
+          </a:p>
+        </p:txBody>
+      </p:sp>
+    </p:spTree>
+    <p:extLst>
+      <p:ext uri="{BB962C8B-B14F-4D97-AF65-F5344CB8AC3E}">
+        <p14:creationId xmlns:p14="http://schemas.microsoft.com/office/powerpoint/2010/main" val="450978869"/>
+      </p:ext>
+    </p:extLst>
+  </p:cSld>
+  <p:clrMapOvr>
+    <a:masterClrMapping/>
+  </p:clrMapOvr>
 </p:sld>
 </file>
 

</xml_diff>

<commit_message>
More on the atomics lecture, with an ordering example.
</commit_message>
<xml_diff>
--- a/Lectures/Atomics/Atomics.pptx
+++ b/Lectures/Atomics/Atomics.pptx
@@ -5,7 +5,7 @@
     <p:sldMasterId id="2147483660" r:id="rId1"/>
   </p:sldMasterIdLst>
   <p:notesMasterIdLst>
-    <p:notesMasterId r:id="rId11"/>
+    <p:notesMasterId r:id="rId15"/>
   </p:notesMasterIdLst>
   <p:sldIdLst>
     <p:sldId id="256" r:id="rId2"/>
@@ -17,6 +17,10 @@
     <p:sldId id="263" r:id="rId8"/>
     <p:sldId id="264" r:id="rId9"/>
     <p:sldId id="265" r:id="rId10"/>
+    <p:sldId id="266" r:id="rId11"/>
+    <p:sldId id="267" r:id="rId12"/>
+    <p:sldId id="268" r:id="rId13"/>
+    <p:sldId id="269" r:id="rId14"/>
   </p:sldIdLst>
   <p:sldSz cx="9144000" cy="6858000" type="screen4x3"/>
   <p:notesSz cx="6858000" cy="9144000"/>
@@ -200,7 +204,7 @@
           <a:p>
             <a:fld id="{DBE0ECA1-3FBF-48AE-AD2A-4439AE745E19}" type="datetimeFigureOut">
               <a:rPr lang="en-US" smtClean="0"/>
-              <a:t>12/6/2013</a:t>
+              <a:t>12/10/2013</a:t>
             </a:fld>
             <a:endParaRPr lang="en-US"/>
           </a:p>
@@ -661,7 +665,7 @@
           <a:p>
             <a:fld id="{9769DED8-28D4-45B9-A00F-7CFE9335FEA6}" type="datetime1">
               <a:rPr lang="en-US" smtClean="0"/>
-              <a:t>12/6/2013</a:t>
+              <a:t>12/10/2013</a:t>
             </a:fld>
             <a:endParaRPr lang="en-US"/>
           </a:p>
@@ -926,7 +930,7 @@
           <a:p>
             <a:fld id="{2DB3D439-1F88-44B4-B5F7-F9BCD4064257}" type="datetime1">
               <a:rPr lang="en-US" smtClean="0"/>
-              <a:t>12/6/2013</a:t>
+              <a:t>12/10/2013</a:t>
             </a:fld>
             <a:endParaRPr lang="en-US"/>
           </a:p>
@@ -1101,7 +1105,7 @@
           <a:p>
             <a:fld id="{99C5638F-6F55-4055-935C-67841BE78C36}" type="datetime1">
               <a:rPr lang="en-US" smtClean="0"/>
-              <a:t>12/6/2013</a:t>
+              <a:t>12/10/2013</a:t>
             </a:fld>
             <a:endParaRPr lang="en-US"/>
           </a:p>
@@ -1266,7 +1270,7 @@
           <a:p>
             <a:fld id="{E6987D90-0C92-4B22-A29D-FED15412CED2}" type="datetime1">
               <a:rPr lang="en-US" smtClean="0"/>
-              <a:t>12/6/2013</a:t>
+              <a:t>12/10/2013</a:t>
             </a:fld>
             <a:endParaRPr lang="en-US"/>
           </a:p>
@@ -1515,7 +1519,7 @@
           <a:p>
             <a:fld id="{DDB67BC4-9554-49E0-BCB3-D1EF965BA0B8}" type="datetime1">
               <a:rPr lang="en-US" smtClean="0"/>
-              <a:t>12/6/2013</a:t>
+              <a:t>12/10/2013</a:t>
             </a:fld>
             <a:endParaRPr lang="en-US"/>
           </a:p>
@@ -1798,7 +1802,7 @@
           <a:p>
             <a:fld id="{EC24D770-803D-4E01-921C-9C100DD8230C}" type="datetime1">
               <a:rPr lang="en-US" smtClean="0"/>
-              <a:t>12/6/2013</a:t>
+              <a:t>12/10/2013</a:t>
             </a:fld>
             <a:endParaRPr lang="en-US"/>
           </a:p>
@@ -2237,7 +2241,7 @@
           <a:p>
             <a:fld id="{356AD44B-78A4-4209-8070-7DCBE2DC4992}" type="datetime1">
               <a:rPr lang="en-US" smtClean="0"/>
-              <a:t>12/6/2013</a:t>
+              <a:t>12/10/2013</a:t>
             </a:fld>
             <a:endParaRPr lang="en-US"/>
           </a:p>
@@ -2350,7 +2354,7 @@
           <a:p>
             <a:fld id="{A993C59A-7CA2-467F-B7F1-9096881A01B8}" type="datetime1">
               <a:rPr lang="en-US" smtClean="0"/>
-              <a:t>12/6/2013</a:t>
+              <a:t>12/10/2013</a:t>
             </a:fld>
             <a:endParaRPr lang="en-US"/>
           </a:p>
@@ -2440,7 +2444,7 @@
           <a:p>
             <a:fld id="{2B6B58D0-2488-434A-8ED1-692E09B85CC5}" type="datetime1">
               <a:rPr lang="en-US" smtClean="0"/>
-              <a:t>12/6/2013</a:t>
+              <a:t>12/10/2013</a:t>
             </a:fld>
             <a:endParaRPr lang="en-US"/>
           </a:p>
@@ -2682,7 +2686,7 @@
           <a:p>
             <a:fld id="{FDB0AFC2-7D64-4F61-A7B7-9932D3305DDA}" type="datetime1">
               <a:rPr lang="en-US" smtClean="0"/>
-              <a:t>12/6/2013</a:t>
+              <a:t>12/10/2013</a:t>
             </a:fld>
             <a:endParaRPr lang="en-US"/>
           </a:p>
@@ -2976,7 +2980,7 @@
           <a:p>
             <a:fld id="{4983D17A-D7B2-4ECE-8A2C-93679B9D177B}" type="datetime1">
               <a:rPr lang="en-US" smtClean="0"/>
-              <a:t>12/6/2013</a:t>
+              <a:t>12/10/2013</a:t>
             </a:fld>
             <a:endParaRPr lang="en-US"/>
           </a:p>
@@ -3270,7 +3274,7 @@
           <a:p>
             <a:fld id="{2A5275F7-419E-4C23-8A3D-2EE5742B2EC9}" type="datetime1">
               <a:rPr lang="en-US" smtClean="0"/>
-              <a:t>12/6/2013</a:t>
+              <a:t>12/10/2013</a:t>
             </a:fld>
             <a:endParaRPr lang="en-US"/>
           </a:p>
@@ -3848,6 +3852,1112 @@
 </p:sld>
 </file>
 
+<file path=ppt/slides/slide10.xml><?xml version="1.0" encoding="utf-8"?>
+<p:sld xmlns:a="http://schemas.openxmlformats.org/drawingml/2006/main" xmlns:r="http://schemas.openxmlformats.org/officeDocument/2006/relationships" xmlns:p="http://schemas.openxmlformats.org/presentationml/2006/main">
+  <p:cSld>
+    <p:spTree>
+      <p:nvGrpSpPr>
+        <p:cNvPr id="1" name=""/>
+        <p:cNvGrpSpPr/>
+        <p:nvPr/>
+      </p:nvGrpSpPr>
+      <p:grpSpPr>
+        <a:xfrm>
+          <a:off x="0" y="0"/>
+          <a:ext cx="0" cy="0"/>
+          <a:chOff x="0" y="0"/>
+          <a:chExt cx="0" cy="0"/>
+        </a:xfrm>
+      </p:grpSpPr>
+      <p:sp>
+        <p:nvSpPr>
+          <p:cNvPr id="2" name="Title 1"/>
+          <p:cNvSpPr>
+            <a:spLocks noGrp="1"/>
+          </p:cNvSpPr>
+          <p:nvPr>
+            <p:ph type="title"/>
+          </p:nvPr>
+        </p:nvSpPr>
+        <p:spPr/>
+        <p:txBody>
+          <a:bodyPr>
+            <a:normAutofit fontScale="90000"/>
+          </a:bodyPr>
+          <a:lstStyle/>
+          <a:p>
+            <a:r>
+              <a:rPr lang="en-US" dirty="0" smtClean="0"/>
+              <a:t>How are atomic types implemented?</a:t>
+            </a:r>
+            <a:endParaRPr lang="en-US" dirty="0"/>
+          </a:p>
+        </p:txBody>
+      </p:sp>
+      <p:sp>
+        <p:nvSpPr>
+          <p:cNvPr id="3" name="Content Placeholder 2"/>
+          <p:cNvSpPr>
+            <a:spLocks noGrp="1"/>
+          </p:cNvSpPr>
+          <p:nvPr>
+            <p:ph idx="1"/>
+          </p:nvPr>
+        </p:nvSpPr>
+        <p:spPr/>
+        <p:txBody>
+          <a:bodyPr>
+            <a:normAutofit lnSpcReduction="10000"/>
+          </a:bodyPr>
+          <a:lstStyle/>
+          <a:p>
+            <a:r>
+              <a:rPr lang="en-US" dirty="0" smtClean="0"/>
+              <a:t>Atomic types may be implemented using locks!</a:t>
+            </a:r>
+          </a:p>
+          <a:p>
+            <a:pPr marL="800100" lvl="1" indent="-342900"/>
+            <a:r>
+              <a:rPr lang="en-US" dirty="0" smtClean="0"/>
+              <a:t>Some CPU architectures do not support atomic instructions</a:t>
+            </a:r>
+          </a:p>
+          <a:p>
+            <a:pPr marL="800100" lvl="1" indent="-342900"/>
+            <a:r>
+              <a:rPr lang="en-US" dirty="0" smtClean="0"/>
+              <a:t>Most user-defined types will not support atomics without locks</a:t>
+            </a:r>
+          </a:p>
+          <a:p>
+            <a:pPr marL="800100" lvl="1" indent="-342900"/>
+            <a:r>
+              <a:rPr lang="en-US" dirty="0" smtClean="0"/>
+              <a:t>On Intel architectures (x86, x64) atomics are supported without locks.</a:t>
+            </a:r>
+          </a:p>
+          <a:p>
+            <a:pPr marL="342900" indent="-342900"/>
+            <a:r>
+              <a:rPr lang="en-US" dirty="0" smtClean="0"/>
+              <a:t>Let’s see an example.</a:t>
+            </a:r>
+          </a:p>
+          <a:p>
+            <a:pPr marL="342900" indent="-342900"/>
+            <a:r>
+              <a:rPr lang="en-US" dirty="0" smtClean="0"/>
+              <a:t>One atomic must be lock-free: </a:t>
+            </a:r>
+            <a:r>
+              <a:rPr lang="en-US" dirty="0" err="1" smtClean="0">
+                <a:latin typeface="Courier New" panose="02070309020205020404" pitchFamily="49" charset="0"/>
+                <a:cs typeface="Courier New" panose="02070309020205020404" pitchFamily="49" charset="0"/>
+              </a:rPr>
+              <a:t>std</a:t>
+            </a:r>
+            <a:r>
+              <a:rPr lang="en-US" dirty="0" smtClean="0">
+                <a:latin typeface="Courier New" panose="02070309020205020404" pitchFamily="49" charset="0"/>
+                <a:cs typeface="Courier New" panose="02070309020205020404" pitchFamily="49" charset="0"/>
+              </a:rPr>
+              <a:t>::</a:t>
+            </a:r>
+            <a:r>
+              <a:rPr lang="en-US" dirty="0" err="1" smtClean="0">
+                <a:latin typeface="Courier New" panose="02070309020205020404" pitchFamily="49" charset="0"/>
+                <a:cs typeface="Courier New" panose="02070309020205020404" pitchFamily="49" charset="0"/>
+              </a:rPr>
+              <a:t>atomic_flag</a:t>
+            </a:r>
+            <a:endParaRPr lang="en-US" dirty="0" smtClean="0">
+              <a:latin typeface="Courier New" panose="02070309020205020404" pitchFamily="49" charset="0"/>
+              <a:cs typeface="Courier New" panose="02070309020205020404" pitchFamily="49" charset="0"/>
+            </a:endParaRPr>
+          </a:p>
+          <a:p>
+            <a:pPr marL="800100" lvl="1" indent="-342900"/>
+            <a:r>
+              <a:rPr lang="en-US" dirty="0" smtClean="0">
+                <a:cs typeface="Courier New" panose="02070309020205020404" pitchFamily="49" charset="0"/>
+              </a:rPr>
+              <a:t>Only has two methods</a:t>
+            </a:r>
+          </a:p>
+          <a:p>
+            <a:pPr marL="1485900" lvl="2" indent="-342900"/>
+            <a:r>
+              <a:rPr lang="en-US" dirty="0">
+                <a:latin typeface="Courier New" panose="02070309020205020404" pitchFamily="49" charset="0"/>
+                <a:cs typeface="Courier New" panose="02070309020205020404" pitchFamily="49" charset="0"/>
+              </a:rPr>
+              <a:t>c</a:t>
+            </a:r>
+            <a:r>
+              <a:rPr lang="en-US" dirty="0" smtClean="0">
+                <a:latin typeface="Courier New" panose="02070309020205020404" pitchFamily="49" charset="0"/>
+                <a:cs typeface="Courier New" panose="02070309020205020404" pitchFamily="49" charset="0"/>
+              </a:rPr>
+              <a:t>lear()</a:t>
+            </a:r>
+          </a:p>
+          <a:p>
+            <a:pPr marL="1485900" lvl="2" indent="-342900"/>
+            <a:r>
+              <a:rPr lang="en-US" dirty="0" err="1" smtClean="0">
+                <a:latin typeface="Courier New" panose="02070309020205020404" pitchFamily="49" charset="0"/>
+                <a:cs typeface="Courier New" panose="02070309020205020404" pitchFamily="49" charset="0"/>
+              </a:rPr>
+              <a:t>test_and_set</a:t>
+            </a:r>
+            <a:r>
+              <a:rPr lang="en-US" dirty="0" smtClean="0">
+                <a:latin typeface="Courier New" panose="02070309020205020404" pitchFamily="49" charset="0"/>
+                <a:cs typeface="Courier New" panose="02070309020205020404" pitchFamily="49" charset="0"/>
+              </a:rPr>
+              <a:t>()</a:t>
+            </a:r>
+          </a:p>
+          <a:p>
+            <a:pPr marL="800100" lvl="1" indent="-342900"/>
+            <a:r>
+              <a:rPr lang="en-US" dirty="0" smtClean="0">
+                <a:cs typeface="Courier New" panose="02070309020205020404" pitchFamily="49" charset="0"/>
+              </a:rPr>
+              <a:t>Used to implement locks and atomics (if necessary)</a:t>
+            </a:r>
+            <a:endParaRPr lang="en-US" dirty="0">
+              <a:cs typeface="Courier New" panose="02070309020205020404" pitchFamily="49" charset="0"/>
+            </a:endParaRPr>
+          </a:p>
+        </p:txBody>
+      </p:sp>
+      <p:sp>
+        <p:nvSpPr>
+          <p:cNvPr id="4" name="Slide Number Placeholder 3"/>
+          <p:cNvSpPr>
+            <a:spLocks noGrp="1"/>
+          </p:cNvSpPr>
+          <p:nvPr>
+            <p:ph type="sldNum" sz="quarter" idx="12"/>
+          </p:nvPr>
+        </p:nvSpPr>
+        <p:spPr/>
+        <p:txBody>
+          <a:bodyPr/>
+          <a:lstStyle/>
+          <a:p>
+            <a:fld id="{6DA12B36-9664-4CB0-8B2E-F4A2F44AE97E}" type="slidenum">
+              <a:rPr lang="en-US" smtClean="0"/>
+              <a:t>10</a:t>
+            </a:fld>
+            <a:endParaRPr lang="en-US"/>
+          </a:p>
+        </p:txBody>
+      </p:sp>
+      <p:sp>
+        <p:nvSpPr>
+          <p:cNvPr id="5" name="Footer Placeholder 4"/>
+          <p:cNvSpPr>
+            <a:spLocks noGrp="1"/>
+          </p:cNvSpPr>
+          <p:nvPr>
+            <p:ph type="ftr" sz="quarter" idx="11"/>
+          </p:nvPr>
+        </p:nvSpPr>
+        <p:spPr/>
+        <p:txBody>
+          <a:bodyPr/>
+          <a:lstStyle/>
+          <a:p>
+            <a:r>
+              <a:rPr lang="en-US" smtClean="0"/>
+              <a:t>Source: Williams, Chapter 5</a:t>
+            </a:r>
+            <a:endParaRPr lang="en-US"/>
+          </a:p>
+        </p:txBody>
+      </p:sp>
+    </p:spTree>
+    <p:extLst>
+      <p:ext uri="{BB962C8B-B14F-4D97-AF65-F5344CB8AC3E}">
+        <p14:creationId xmlns:p14="http://schemas.microsoft.com/office/powerpoint/2010/main" val="2368459386"/>
+      </p:ext>
+    </p:extLst>
+  </p:cSld>
+  <p:clrMapOvr>
+    <a:masterClrMapping/>
+  </p:clrMapOvr>
+  <p:timing>
+    <p:tnLst>
+      <p:par>
+        <p:cTn id="1" dur="indefinite" restart="never" nodeType="tmRoot">
+          <p:childTnLst>
+            <p:seq concurrent="1" nextAc="seek">
+              <p:cTn id="2" dur="indefinite" nodeType="mainSeq">
+                <p:childTnLst>
+                  <p:par>
+                    <p:cTn id="3" fill="hold">
+                      <p:stCondLst>
+                        <p:cond delay="indefinite"/>
+                      </p:stCondLst>
+                      <p:childTnLst>
+                        <p:par>
+                          <p:cTn id="4" fill="hold">
+                            <p:stCondLst>
+                              <p:cond delay="0"/>
+                            </p:stCondLst>
+                            <p:childTnLst>
+                              <p:par>
+                                <p:cTn id="5" presetID="1" presetClass="entr" presetSubtype="0" fill="hold" nodeType="clickEffect">
+                                  <p:stCondLst>
+                                    <p:cond delay="0"/>
+                                  </p:stCondLst>
+                                  <p:childTnLst>
+                                    <p:set>
+                                      <p:cBhvr>
+                                        <p:cTn id="6" dur="1" fill="hold">
+                                          <p:stCondLst>
+                                            <p:cond delay="0"/>
+                                          </p:stCondLst>
+                                        </p:cTn>
+                                        <p:tgtEl>
+                                          <p:spTgt spid="3">
+                                            <p:txEl>
+                                              <p:pRg st="5" end="5"/>
+                                            </p:txEl>
+                                          </p:spTgt>
+                                        </p:tgtEl>
+                                        <p:attrNameLst>
+                                          <p:attrName>style.visibility</p:attrName>
+                                        </p:attrNameLst>
+                                      </p:cBhvr>
+                                      <p:to>
+                                        <p:strVal val="visible"/>
+                                      </p:to>
+                                    </p:set>
+                                  </p:childTnLst>
+                                </p:cTn>
+                              </p:par>
+                              <p:par>
+                                <p:cTn id="7" presetID="1" presetClass="entr" presetSubtype="0" fill="hold" nodeType="withEffect">
+                                  <p:stCondLst>
+                                    <p:cond delay="0"/>
+                                  </p:stCondLst>
+                                  <p:childTnLst>
+                                    <p:set>
+                                      <p:cBhvr>
+                                        <p:cTn id="8" dur="1" fill="hold">
+                                          <p:stCondLst>
+                                            <p:cond delay="0"/>
+                                          </p:stCondLst>
+                                        </p:cTn>
+                                        <p:tgtEl>
+                                          <p:spTgt spid="3">
+                                            <p:txEl>
+                                              <p:pRg st="6" end="6"/>
+                                            </p:txEl>
+                                          </p:spTgt>
+                                        </p:tgtEl>
+                                        <p:attrNameLst>
+                                          <p:attrName>style.visibility</p:attrName>
+                                        </p:attrNameLst>
+                                      </p:cBhvr>
+                                      <p:to>
+                                        <p:strVal val="visible"/>
+                                      </p:to>
+                                    </p:set>
+                                  </p:childTnLst>
+                                </p:cTn>
+                              </p:par>
+                              <p:par>
+                                <p:cTn id="9" presetID="1" presetClass="entr" presetSubtype="0" fill="hold" nodeType="withEffect">
+                                  <p:stCondLst>
+                                    <p:cond delay="0"/>
+                                  </p:stCondLst>
+                                  <p:childTnLst>
+                                    <p:set>
+                                      <p:cBhvr>
+                                        <p:cTn id="10" dur="1" fill="hold">
+                                          <p:stCondLst>
+                                            <p:cond delay="0"/>
+                                          </p:stCondLst>
+                                        </p:cTn>
+                                        <p:tgtEl>
+                                          <p:spTgt spid="3">
+                                            <p:txEl>
+                                              <p:pRg st="7" end="7"/>
+                                            </p:txEl>
+                                          </p:spTgt>
+                                        </p:tgtEl>
+                                        <p:attrNameLst>
+                                          <p:attrName>style.visibility</p:attrName>
+                                        </p:attrNameLst>
+                                      </p:cBhvr>
+                                      <p:to>
+                                        <p:strVal val="visible"/>
+                                      </p:to>
+                                    </p:set>
+                                  </p:childTnLst>
+                                </p:cTn>
+                              </p:par>
+                              <p:par>
+                                <p:cTn id="11" presetID="1" presetClass="entr" presetSubtype="0" fill="hold" nodeType="withEffect">
+                                  <p:stCondLst>
+                                    <p:cond delay="0"/>
+                                  </p:stCondLst>
+                                  <p:childTnLst>
+                                    <p:set>
+                                      <p:cBhvr>
+                                        <p:cTn id="12" dur="1" fill="hold">
+                                          <p:stCondLst>
+                                            <p:cond delay="0"/>
+                                          </p:stCondLst>
+                                        </p:cTn>
+                                        <p:tgtEl>
+                                          <p:spTgt spid="3">
+                                            <p:txEl>
+                                              <p:pRg st="8" end="8"/>
+                                            </p:txEl>
+                                          </p:spTgt>
+                                        </p:tgtEl>
+                                        <p:attrNameLst>
+                                          <p:attrName>style.visibility</p:attrName>
+                                        </p:attrNameLst>
+                                      </p:cBhvr>
+                                      <p:to>
+                                        <p:strVal val="visible"/>
+                                      </p:to>
+                                    </p:set>
+                                  </p:childTnLst>
+                                </p:cTn>
+                              </p:par>
+                              <p:par>
+                                <p:cTn id="13" presetID="1" presetClass="entr" presetSubtype="0" fill="hold" nodeType="withEffect">
+                                  <p:stCondLst>
+                                    <p:cond delay="0"/>
+                                  </p:stCondLst>
+                                  <p:childTnLst>
+                                    <p:set>
+                                      <p:cBhvr>
+                                        <p:cTn id="14" dur="1" fill="hold">
+                                          <p:stCondLst>
+                                            <p:cond delay="0"/>
+                                          </p:stCondLst>
+                                        </p:cTn>
+                                        <p:tgtEl>
+                                          <p:spTgt spid="3">
+                                            <p:txEl>
+                                              <p:pRg st="9" end="9"/>
+                                            </p:txEl>
+                                          </p:spTgt>
+                                        </p:tgtEl>
+                                        <p:attrNameLst>
+                                          <p:attrName>style.visibility</p:attrName>
+                                        </p:attrNameLst>
+                                      </p:cBhvr>
+                                      <p:to>
+                                        <p:strVal val="visible"/>
+                                      </p:to>
+                                    </p:set>
+                                  </p:childTnLst>
+                                </p:cTn>
+                              </p:par>
+                            </p:childTnLst>
+                          </p:cTn>
+                        </p:par>
+                      </p:childTnLst>
+                    </p:cTn>
+                  </p:par>
+                </p:childTnLst>
+              </p:cTn>
+              <p:prevCondLst>
+                <p:cond evt="onPrev" delay="0">
+                  <p:tgtEl>
+                    <p:sldTgt/>
+                  </p:tgtEl>
+                </p:cond>
+              </p:prevCondLst>
+              <p:nextCondLst>
+                <p:cond evt="onNext" delay="0">
+                  <p:tgtEl>
+                    <p:sldTgt/>
+                  </p:tgtEl>
+                </p:cond>
+              </p:nextCondLst>
+            </p:seq>
+          </p:childTnLst>
+        </p:cTn>
+      </p:par>
+    </p:tnLst>
+  </p:timing>
+</p:sld>
+</file>
+
+<file path=ppt/slides/slide11.xml><?xml version="1.0" encoding="utf-8"?>
+<p:sld xmlns:a="http://schemas.openxmlformats.org/drawingml/2006/main" xmlns:r="http://schemas.openxmlformats.org/officeDocument/2006/relationships" xmlns:p="http://schemas.openxmlformats.org/presentationml/2006/main">
+  <p:cSld>
+    <p:spTree>
+      <p:nvGrpSpPr>
+        <p:cNvPr id="1" name=""/>
+        <p:cNvGrpSpPr/>
+        <p:nvPr/>
+      </p:nvGrpSpPr>
+      <p:grpSpPr>
+        <a:xfrm>
+          <a:off x="0" y="0"/>
+          <a:ext cx="0" cy="0"/>
+          <a:chOff x="0" y="0"/>
+          <a:chExt cx="0" cy="0"/>
+        </a:xfrm>
+      </p:grpSpPr>
+      <p:sp>
+        <p:nvSpPr>
+          <p:cNvPr id="2" name="Title 1"/>
+          <p:cNvSpPr>
+            <a:spLocks noGrp="1"/>
+          </p:cNvSpPr>
+          <p:nvPr>
+            <p:ph type="title"/>
+          </p:nvPr>
+        </p:nvSpPr>
+        <p:spPr/>
+        <p:txBody>
+          <a:bodyPr/>
+          <a:lstStyle/>
+          <a:p>
+            <a:r>
+              <a:rPr lang="en-US" dirty="0" smtClean="0"/>
+              <a:t>Enforcing ordering</a:t>
+            </a:r>
+            <a:endParaRPr lang="en-US" dirty="0"/>
+          </a:p>
+        </p:txBody>
+      </p:sp>
+      <p:sp>
+        <p:nvSpPr>
+          <p:cNvPr id="3" name="Content Placeholder 2"/>
+          <p:cNvSpPr>
+            <a:spLocks noGrp="1"/>
+          </p:cNvSpPr>
+          <p:nvPr>
+            <p:ph idx="1"/>
+          </p:nvPr>
+        </p:nvSpPr>
+        <p:spPr/>
+        <p:txBody>
+          <a:bodyPr/>
+          <a:lstStyle/>
+          <a:p>
+            <a:r>
+              <a:rPr lang="en-US" dirty="0" smtClean="0"/>
+              <a:t>The C++ memory model defines two important relationships</a:t>
+            </a:r>
+          </a:p>
+          <a:p>
+            <a:pPr marL="800100" lvl="1" indent="-342900"/>
+            <a:r>
+              <a:rPr lang="en-US" i="1" dirty="0" smtClean="0"/>
+              <a:t>synchronizes-with</a:t>
+            </a:r>
+          </a:p>
+          <a:p>
+            <a:pPr marL="1485900" lvl="2" indent="-342900"/>
+            <a:r>
+              <a:rPr lang="en-US" dirty="0" smtClean="0"/>
+              <a:t>Occurs only with atomics</a:t>
+            </a:r>
+          </a:p>
+          <a:p>
+            <a:pPr marL="1485900" lvl="2" indent="-342900"/>
+            <a:r>
+              <a:rPr lang="en-US" dirty="0" smtClean="0"/>
+              <a:t>Causes a load and a store to work together</a:t>
+            </a:r>
+          </a:p>
+          <a:p>
+            <a:pPr marL="1485900" lvl="2" indent="-342900"/>
+            <a:r>
+              <a:rPr lang="en-US" dirty="0" smtClean="0"/>
+              <a:t>An atomic write (store) synchronizes-with an atomic read(load) on the same memory location</a:t>
+            </a:r>
+          </a:p>
+          <a:p>
+            <a:pPr marL="800100" lvl="1" indent="-342900"/>
+            <a:r>
+              <a:rPr lang="en-US" i="1" dirty="0" smtClean="0"/>
+              <a:t>happens-before</a:t>
+            </a:r>
+          </a:p>
+          <a:p>
+            <a:pPr marL="1485900" lvl="2" indent="-342900"/>
+            <a:r>
+              <a:rPr lang="en-US" dirty="0" smtClean="0"/>
+              <a:t>Not specific to atomics or threads</a:t>
+            </a:r>
+          </a:p>
+          <a:p>
+            <a:pPr marL="1485900" lvl="2" indent="-342900"/>
+            <a:r>
+              <a:rPr lang="en-US" dirty="0" smtClean="0"/>
+              <a:t>If A is sequenced B, A happens-before B</a:t>
+            </a:r>
+          </a:p>
+          <a:p>
+            <a:pPr marL="1485900" lvl="2" indent="-342900"/>
+            <a:r>
+              <a:rPr lang="en-US" dirty="0" smtClean="0"/>
+              <a:t>If A happens-before B, and B is on another thread, then we have an </a:t>
+            </a:r>
+            <a:r>
+              <a:rPr lang="en-US" i="1" dirty="0" smtClean="0"/>
+              <a:t>inter-thread happens-before</a:t>
+            </a:r>
+            <a:endParaRPr lang="en-US" dirty="0" smtClean="0"/>
+          </a:p>
+          <a:p>
+            <a:pPr marL="1485900" lvl="2" indent="-342900"/>
+            <a:r>
+              <a:rPr lang="en-US" dirty="0" smtClean="0"/>
+              <a:t>A happens-before B and B happens-before C implies A happens-before C (transitive </a:t>
+            </a:r>
+            <a:r>
+              <a:rPr lang="en-US" dirty="0" err="1" smtClean="0"/>
+              <a:t>propertery</a:t>
+            </a:r>
+            <a:r>
+              <a:rPr lang="en-US" dirty="0" smtClean="0"/>
+              <a:t>)</a:t>
+            </a:r>
+            <a:endParaRPr lang="en-US" dirty="0"/>
+          </a:p>
+        </p:txBody>
+      </p:sp>
+      <p:sp>
+        <p:nvSpPr>
+          <p:cNvPr id="4" name="Slide Number Placeholder 3"/>
+          <p:cNvSpPr>
+            <a:spLocks noGrp="1"/>
+          </p:cNvSpPr>
+          <p:nvPr>
+            <p:ph type="sldNum" sz="quarter" idx="12"/>
+          </p:nvPr>
+        </p:nvSpPr>
+        <p:spPr/>
+        <p:txBody>
+          <a:bodyPr/>
+          <a:lstStyle/>
+          <a:p>
+            <a:fld id="{6DA12B36-9664-4CB0-8B2E-F4A2F44AE97E}" type="slidenum">
+              <a:rPr lang="en-US" smtClean="0"/>
+              <a:t>11</a:t>
+            </a:fld>
+            <a:endParaRPr lang="en-US"/>
+          </a:p>
+        </p:txBody>
+      </p:sp>
+    </p:spTree>
+    <p:extLst>
+      <p:ext uri="{BB962C8B-B14F-4D97-AF65-F5344CB8AC3E}">
+        <p14:creationId xmlns:p14="http://schemas.microsoft.com/office/powerpoint/2010/main" val="3320273574"/>
+      </p:ext>
+    </p:extLst>
+  </p:cSld>
+  <p:clrMapOvr>
+    <a:masterClrMapping/>
+  </p:clrMapOvr>
+  <p:timing>
+    <p:tnLst>
+      <p:par>
+        <p:cTn id="1" dur="indefinite" restart="never" nodeType="tmRoot"/>
+      </p:par>
+    </p:tnLst>
+  </p:timing>
+</p:sld>
+</file>
+
+<file path=ppt/slides/slide12.xml><?xml version="1.0" encoding="utf-8"?>
+<p:sld xmlns:a="http://schemas.openxmlformats.org/drawingml/2006/main" xmlns:r="http://schemas.openxmlformats.org/officeDocument/2006/relationships" xmlns:p="http://schemas.openxmlformats.org/presentationml/2006/main">
+  <p:cSld>
+    <p:spTree>
+      <p:nvGrpSpPr>
+        <p:cNvPr id="1" name=""/>
+        <p:cNvGrpSpPr/>
+        <p:nvPr/>
+      </p:nvGrpSpPr>
+      <p:grpSpPr>
+        <a:xfrm>
+          <a:off x="0" y="0"/>
+          <a:ext cx="0" cy="0"/>
+          <a:chOff x="0" y="0"/>
+          <a:chExt cx="0" cy="0"/>
+        </a:xfrm>
+      </p:grpSpPr>
+      <p:sp>
+        <p:nvSpPr>
+          <p:cNvPr id="2" name="Title 1"/>
+          <p:cNvSpPr>
+            <a:spLocks noGrp="1"/>
+          </p:cNvSpPr>
+          <p:nvPr>
+            <p:ph type="title"/>
+          </p:nvPr>
+        </p:nvSpPr>
+        <p:spPr/>
+        <p:txBody>
+          <a:bodyPr/>
+          <a:lstStyle/>
+          <a:p>
+            <a:r>
+              <a:rPr lang="en-US" dirty="0" smtClean="0"/>
+              <a:t>Example</a:t>
+            </a:r>
+            <a:endParaRPr lang="en-US" dirty="0"/>
+          </a:p>
+        </p:txBody>
+      </p:sp>
+      <p:sp>
+        <p:nvSpPr>
+          <p:cNvPr id="3" name="Content Placeholder 2"/>
+          <p:cNvSpPr>
+            <a:spLocks noGrp="1"/>
+          </p:cNvSpPr>
+          <p:nvPr>
+            <p:ph idx="1"/>
+          </p:nvPr>
+        </p:nvSpPr>
+        <p:spPr/>
+        <p:txBody>
+          <a:bodyPr/>
+          <a:lstStyle/>
+          <a:p>
+            <a:r>
+              <a:rPr lang="en-US" dirty="0" smtClean="0"/>
+              <a:t>Let’s look at an example</a:t>
+            </a:r>
+          </a:p>
+          <a:p>
+            <a:pPr marL="800100" lvl="1" indent="-342900"/>
+            <a:r>
+              <a:rPr lang="en-US" dirty="0" smtClean="0"/>
+              <a:t>Operation 1 happens-before operation 2</a:t>
+            </a:r>
+          </a:p>
+          <a:p>
+            <a:pPr marL="800100" lvl="1" indent="-342900"/>
+            <a:r>
+              <a:rPr lang="en-US" dirty="0" smtClean="0"/>
+              <a:t>Operation 3 happens-before operation 4</a:t>
+            </a:r>
+          </a:p>
+          <a:p>
+            <a:pPr marL="800100" lvl="1" indent="-342900"/>
+            <a:r>
+              <a:rPr lang="en-US" dirty="0" smtClean="0"/>
+              <a:t>We have no synchronization between the store in operation 4 and the load in operation 1!</a:t>
+            </a:r>
+          </a:p>
+          <a:p>
+            <a:pPr marL="1485900" lvl="2" indent="-342900"/>
+            <a:r>
+              <a:rPr lang="en-US" dirty="0" smtClean="0"/>
+              <a:t>We have a data race (undefined behavior)</a:t>
+            </a:r>
+          </a:p>
+          <a:p>
+            <a:pPr marL="1485900" lvl="2" indent="-342900"/>
+            <a:r>
+              <a:rPr lang="en-US" dirty="0" smtClean="0"/>
+              <a:t>The </a:t>
+            </a:r>
+            <a:r>
+              <a:rPr lang="en-US" dirty="0" err="1" smtClean="0">
+                <a:latin typeface="Courier New" panose="02070309020205020404" pitchFamily="49" charset="0"/>
+                <a:cs typeface="Courier New" panose="02070309020205020404" pitchFamily="49" charset="0"/>
+              </a:rPr>
+              <a:t>data_ready</a:t>
+            </a:r>
+            <a:r>
+              <a:rPr lang="en-US" dirty="0" smtClean="0">
+                <a:cs typeface="Courier New" panose="02070309020205020404" pitchFamily="49" charset="0"/>
+              </a:rPr>
+              <a:t> variable may</a:t>
+            </a:r>
+          </a:p>
+          <a:p>
+            <a:pPr marL="1943100" lvl="3" indent="-342900"/>
+            <a:r>
+              <a:rPr lang="en-US" dirty="0" smtClean="0">
+                <a:cs typeface="Courier New" panose="02070309020205020404" pitchFamily="49" charset="0"/>
+              </a:rPr>
+              <a:t>Be stored in a register</a:t>
+            </a:r>
+          </a:p>
+          <a:p>
+            <a:pPr marL="1943100" lvl="3" indent="-342900"/>
+            <a:r>
+              <a:rPr lang="en-US" dirty="0">
+                <a:cs typeface="Courier New" panose="02070309020205020404" pitchFamily="49" charset="0"/>
+              </a:rPr>
+              <a:t>N</a:t>
+            </a:r>
+            <a:r>
+              <a:rPr lang="en-US" dirty="0" smtClean="0">
+                <a:cs typeface="Courier New" panose="02070309020205020404" pitchFamily="49" charset="0"/>
+              </a:rPr>
+              <a:t>ot written back to memory from cache</a:t>
+            </a:r>
+          </a:p>
+          <a:p>
+            <a:pPr marL="800100" lvl="1" indent="-342900"/>
+            <a:r>
+              <a:rPr lang="en-US" dirty="0" smtClean="0">
+                <a:cs typeface="Courier New" panose="02070309020205020404" pitchFamily="49" charset="0"/>
+              </a:rPr>
+              <a:t>We need an synchronizes-with between 4 and 1</a:t>
+            </a:r>
+          </a:p>
+          <a:p>
+            <a:pPr marL="800100" lvl="1" indent="-342900"/>
+            <a:r>
+              <a:rPr lang="en-US" dirty="0" smtClean="0">
+                <a:cs typeface="Courier New" panose="02070309020205020404" pitchFamily="49" charset="0"/>
+              </a:rPr>
+              <a:t>Using </a:t>
+            </a:r>
+            <a:r>
+              <a:rPr lang="en-US" dirty="0" err="1" smtClean="0">
+                <a:latin typeface="Courier New" panose="02070309020205020404" pitchFamily="49" charset="0"/>
+                <a:cs typeface="Courier New" panose="02070309020205020404" pitchFamily="49" charset="0"/>
+              </a:rPr>
+              <a:t>std</a:t>
+            </a:r>
+            <a:r>
+              <a:rPr lang="en-US" dirty="0" smtClean="0">
+                <a:latin typeface="Courier New" panose="02070309020205020404" pitchFamily="49" charset="0"/>
+                <a:cs typeface="Courier New" panose="02070309020205020404" pitchFamily="49" charset="0"/>
+              </a:rPr>
+              <a:t>::atomic</a:t>
+            </a:r>
+            <a:r>
+              <a:rPr lang="en-US" dirty="0" smtClean="0">
+                <a:cs typeface="Courier New" panose="02070309020205020404" pitchFamily="49" charset="0"/>
+              </a:rPr>
+              <a:t> provides this</a:t>
+            </a:r>
+          </a:p>
+          <a:p>
+            <a:pPr marL="800100" lvl="1" indent="-342900"/>
+            <a:r>
+              <a:rPr lang="en-US" dirty="0" smtClean="0">
+                <a:cs typeface="Courier New" panose="02070309020205020404" pitchFamily="49" charset="0"/>
+              </a:rPr>
+              <a:t>We have an inter-thread happens-before between 4 and 1</a:t>
+            </a:r>
+            <a:endParaRPr lang="en-US" dirty="0">
+              <a:cs typeface="Courier New" panose="02070309020205020404" pitchFamily="49" charset="0"/>
+            </a:endParaRPr>
+          </a:p>
+        </p:txBody>
+      </p:sp>
+      <p:sp>
+        <p:nvSpPr>
+          <p:cNvPr id="4" name="Slide Number Placeholder 3"/>
+          <p:cNvSpPr>
+            <a:spLocks noGrp="1"/>
+          </p:cNvSpPr>
+          <p:nvPr>
+            <p:ph type="sldNum" sz="quarter" idx="12"/>
+          </p:nvPr>
+        </p:nvSpPr>
+        <p:spPr/>
+        <p:txBody>
+          <a:bodyPr/>
+          <a:lstStyle/>
+          <a:p>
+            <a:fld id="{6DA12B36-9664-4CB0-8B2E-F4A2F44AE97E}" type="slidenum">
+              <a:rPr lang="en-US" smtClean="0"/>
+              <a:t>12</a:t>
+            </a:fld>
+            <a:endParaRPr lang="en-US"/>
+          </a:p>
+        </p:txBody>
+      </p:sp>
+    </p:spTree>
+    <p:extLst>
+      <p:ext uri="{BB962C8B-B14F-4D97-AF65-F5344CB8AC3E}">
+        <p14:creationId xmlns:p14="http://schemas.microsoft.com/office/powerpoint/2010/main" val="3494296008"/>
+      </p:ext>
+    </p:extLst>
+  </p:cSld>
+  <p:clrMapOvr>
+    <a:masterClrMapping/>
+  </p:clrMapOvr>
+  <p:timing>
+    <p:tnLst>
+      <p:par>
+        <p:cTn id="1" dur="indefinite" restart="never" nodeType="tmRoot">
+          <p:childTnLst>
+            <p:seq concurrent="1" nextAc="seek">
+              <p:cTn id="2" dur="indefinite" nodeType="mainSeq">
+                <p:childTnLst>
+                  <p:par>
+                    <p:cTn id="3" fill="hold">
+                      <p:stCondLst>
+                        <p:cond delay="indefinite"/>
+                      </p:stCondLst>
+                      <p:childTnLst>
+                        <p:par>
+                          <p:cTn id="4" fill="hold">
+                            <p:stCondLst>
+                              <p:cond delay="0"/>
+                            </p:stCondLst>
+                            <p:childTnLst>
+                              <p:par>
+                                <p:cTn id="5" presetID="1" presetClass="entr" presetSubtype="0" fill="hold" nodeType="clickEffect">
+                                  <p:stCondLst>
+                                    <p:cond delay="0"/>
+                                  </p:stCondLst>
+                                  <p:childTnLst>
+                                    <p:set>
+                                      <p:cBhvr>
+                                        <p:cTn id="6" dur="1" fill="hold">
+                                          <p:stCondLst>
+                                            <p:cond delay="0"/>
+                                          </p:stCondLst>
+                                        </p:cTn>
+                                        <p:tgtEl>
+                                          <p:spTgt spid="3">
+                                            <p:txEl>
+                                              <p:pRg st="8" end="8"/>
+                                            </p:txEl>
+                                          </p:spTgt>
+                                        </p:tgtEl>
+                                        <p:attrNameLst>
+                                          <p:attrName>style.visibility</p:attrName>
+                                        </p:attrNameLst>
+                                      </p:cBhvr>
+                                      <p:to>
+                                        <p:strVal val="visible"/>
+                                      </p:to>
+                                    </p:set>
+                                  </p:childTnLst>
+                                </p:cTn>
+                              </p:par>
+                            </p:childTnLst>
+                          </p:cTn>
+                        </p:par>
+                      </p:childTnLst>
+                    </p:cTn>
+                  </p:par>
+                  <p:par>
+                    <p:cTn id="7" fill="hold">
+                      <p:stCondLst>
+                        <p:cond delay="indefinite"/>
+                      </p:stCondLst>
+                      <p:childTnLst>
+                        <p:par>
+                          <p:cTn id="8" fill="hold">
+                            <p:stCondLst>
+                              <p:cond delay="0"/>
+                            </p:stCondLst>
+                            <p:childTnLst>
+                              <p:par>
+                                <p:cTn id="9" presetID="1" presetClass="entr" presetSubtype="0" fill="hold" nodeType="clickEffect">
+                                  <p:stCondLst>
+                                    <p:cond delay="0"/>
+                                  </p:stCondLst>
+                                  <p:childTnLst>
+                                    <p:set>
+                                      <p:cBhvr>
+                                        <p:cTn id="10" dur="1" fill="hold">
+                                          <p:stCondLst>
+                                            <p:cond delay="0"/>
+                                          </p:stCondLst>
+                                        </p:cTn>
+                                        <p:tgtEl>
+                                          <p:spTgt spid="3">
+                                            <p:txEl>
+                                              <p:pRg st="9" end="9"/>
+                                            </p:txEl>
+                                          </p:spTgt>
+                                        </p:tgtEl>
+                                        <p:attrNameLst>
+                                          <p:attrName>style.visibility</p:attrName>
+                                        </p:attrNameLst>
+                                      </p:cBhvr>
+                                      <p:to>
+                                        <p:strVal val="visible"/>
+                                      </p:to>
+                                    </p:set>
+                                  </p:childTnLst>
+                                </p:cTn>
+                              </p:par>
+                              <p:par>
+                                <p:cTn id="11" presetID="1" presetClass="entr" presetSubtype="0" fill="hold" nodeType="withEffect">
+                                  <p:stCondLst>
+                                    <p:cond delay="0"/>
+                                  </p:stCondLst>
+                                  <p:childTnLst>
+                                    <p:set>
+                                      <p:cBhvr>
+                                        <p:cTn id="12" dur="1" fill="hold">
+                                          <p:stCondLst>
+                                            <p:cond delay="0"/>
+                                          </p:stCondLst>
+                                        </p:cTn>
+                                        <p:tgtEl>
+                                          <p:spTgt spid="3">
+                                            <p:txEl>
+                                              <p:pRg st="10" end="10"/>
+                                            </p:txEl>
+                                          </p:spTgt>
+                                        </p:tgtEl>
+                                        <p:attrNameLst>
+                                          <p:attrName>style.visibility</p:attrName>
+                                        </p:attrNameLst>
+                                      </p:cBhvr>
+                                      <p:to>
+                                        <p:strVal val="visible"/>
+                                      </p:to>
+                                    </p:set>
+                                  </p:childTnLst>
+                                </p:cTn>
+                              </p:par>
+                            </p:childTnLst>
+                          </p:cTn>
+                        </p:par>
+                      </p:childTnLst>
+                    </p:cTn>
+                  </p:par>
+                </p:childTnLst>
+              </p:cTn>
+              <p:prevCondLst>
+                <p:cond evt="onPrev" delay="0">
+                  <p:tgtEl>
+                    <p:sldTgt/>
+                  </p:tgtEl>
+                </p:cond>
+              </p:prevCondLst>
+              <p:nextCondLst>
+                <p:cond evt="onNext" delay="0">
+                  <p:tgtEl>
+                    <p:sldTgt/>
+                  </p:tgtEl>
+                </p:cond>
+              </p:nextCondLst>
+            </p:seq>
+          </p:childTnLst>
+        </p:cTn>
+      </p:par>
+    </p:tnLst>
+  </p:timing>
+</p:sld>
+</file>
+
+<file path=ppt/slides/slide13.xml><?xml version="1.0" encoding="utf-8"?>
+<p:sld xmlns:a="http://schemas.openxmlformats.org/drawingml/2006/main" xmlns:r="http://schemas.openxmlformats.org/officeDocument/2006/relationships" xmlns:p="http://schemas.openxmlformats.org/presentationml/2006/main">
+  <p:cSld>
+    <p:spTree>
+      <p:nvGrpSpPr>
+        <p:cNvPr id="1" name=""/>
+        <p:cNvGrpSpPr/>
+        <p:nvPr/>
+      </p:nvGrpSpPr>
+      <p:grpSpPr>
+        <a:xfrm>
+          <a:off x="0" y="0"/>
+          <a:ext cx="0" cy="0"/>
+          <a:chOff x="0" y="0"/>
+          <a:chExt cx="0" cy="0"/>
+        </a:xfrm>
+      </p:grpSpPr>
+      <p:sp>
+        <p:nvSpPr>
+          <p:cNvPr id="2" name="Title 1"/>
+          <p:cNvSpPr>
+            <a:spLocks noGrp="1"/>
+          </p:cNvSpPr>
+          <p:nvPr>
+            <p:ph type="title"/>
+          </p:nvPr>
+        </p:nvSpPr>
+        <p:spPr/>
+        <p:txBody>
+          <a:bodyPr/>
+          <a:lstStyle/>
+          <a:p>
+            <a:r>
+              <a:rPr lang="en-US" dirty="0" smtClean="0"/>
+              <a:t>Memory ordering</a:t>
+            </a:r>
+            <a:endParaRPr lang="en-US" dirty="0"/>
+          </a:p>
+        </p:txBody>
+      </p:sp>
+      <p:sp>
+        <p:nvSpPr>
+          <p:cNvPr id="3" name="Content Placeholder 2"/>
+          <p:cNvSpPr>
+            <a:spLocks noGrp="1"/>
+          </p:cNvSpPr>
+          <p:nvPr>
+            <p:ph idx="1"/>
+          </p:nvPr>
+        </p:nvSpPr>
+        <p:spPr/>
+        <p:txBody>
+          <a:bodyPr/>
+          <a:lstStyle/>
+          <a:p>
+            <a:endParaRPr lang="en-US"/>
+          </a:p>
+        </p:txBody>
+      </p:sp>
+      <p:sp>
+        <p:nvSpPr>
+          <p:cNvPr id="4" name="Slide Number Placeholder 3"/>
+          <p:cNvSpPr>
+            <a:spLocks noGrp="1"/>
+          </p:cNvSpPr>
+          <p:nvPr>
+            <p:ph type="sldNum" sz="quarter" idx="12"/>
+          </p:nvPr>
+        </p:nvSpPr>
+        <p:spPr/>
+        <p:txBody>
+          <a:bodyPr/>
+          <a:lstStyle/>
+          <a:p>
+            <a:fld id="{6DA12B36-9664-4CB0-8B2E-F4A2F44AE97E}" type="slidenum">
+              <a:rPr lang="en-US" smtClean="0"/>
+              <a:t>13</a:t>
+            </a:fld>
+            <a:endParaRPr lang="en-US"/>
+          </a:p>
+        </p:txBody>
+      </p:sp>
+    </p:spTree>
+    <p:extLst>
+      <p:ext uri="{BB962C8B-B14F-4D97-AF65-F5344CB8AC3E}">
+        <p14:creationId xmlns:p14="http://schemas.microsoft.com/office/powerpoint/2010/main" val="3229650377"/>
+      </p:ext>
+    </p:extLst>
+  </p:cSld>
+  <p:clrMapOvr>
+    <a:masterClrMapping/>
+  </p:clrMapOvr>
+  <p:timing>
+    <p:tnLst>
+      <p:par>
+        <p:cTn id="1" dur="indefinite" restart="never" nodeType="tmRoot"/>
+      </p:par>
+    </p:tnLst>
+  </p:timing>
+</p:sld>
+</file>
+
 <file path=ppt/slides/slide2.xml><?xml version="1.0" encoding="utf-8"?>
 <p:sld xmlns:a="http://schemas.openxmlformats.org/drawingml/2006/main" xmlns:r="http://schemas.openxmlformats.org/officeDocument/2006/relationships" xmlns:p="http://schemas.openxmlformats.org/presentationml/2006/main">
   <p:cSld>
@@ -5574,11 +6684,7 @@
             <a:pPr marL="800100" lvl="1" indent="-342900"/>
             <a:r>
               <a:rPr lang="en-US" dirty="0" smtClean="0"/>
-              <a:t>Atomic operations are more expensive then non-atomic </a:t>
-            </a:r>
-            <a:r>
-              <a:rPr lang="en-US" dirty="0" smtClean="0"/>
-              <a:t>operations</a:t>
+              <a:t>Atomic operations are more expensive then non-atomic operations</a:t>
             </a:r>
           </a:p>
           <a:p>
@@ -5587,7 +6693,6 @@
               <a:rPr lang="en-US" dirty="0" smtClean="0"/>
               <a:t>Atomic operations occur on atomic types</a:t>
             </a:r>
-            <a:endParaRPr lang="en-US" dirty="0" smtClean="0"/>
           </a:p>
           <a:p>
             <a:pPr marL="1485900" lvl="2" indent="-342900"/>
@@ -5939,7 +7044,17 @@
             </a:r>
             <a:r>
               <a:rPr lang="en-US" dirty="0" smtClean="0"/>
-              <a:t> occurs when all of these conditions apply:</a:t>
+              <a:t> occurs when </a:t>
+            </a:r>
+            <a:r>
+              <a:rPr lang="en-US" dirty="0" smtClean="0">
+                <a:latin typeface="+mj-lt"/>
+              </a:rPr>
+              <a:t>all</a:t>
+            </a:r>
+            <a:r>
+              <a:rPr lang="en-US" dirty="0" smtClean="0"/>
+              <a:t> of these conditions apply:</a:t>
             </a:r>
           </a:p>
           <a:p>
@@ -6056,10 +7171,10 @@
           <a:lstStyle/>
           <a:p>
             <a:r>
-              <a:rPr lang="en-US" smtClean="0"/>
+              <a:rPr lang="en-US" dirty="0" smtClean="0"/>
               <a:t>Source: Williams, Chapter 5</a:t>
             </a:r>
-            <a:endParaRPr lang="en-US"/>
+            <a:endParaRPr lang="en-US" dirty="0"/>
           </a:p>
         </p:txBody>
       </p:sp>
@@ -6073,6 +7188,13 @@
   <p:clrMapOvr>
     <a:masterClrMapping/>
   </p:clrMapOvr>
+  <p:timing>
+    <p:tnLst>
+      <p:par>
+        <p:cTn id="1" dur="indefinite" restart="never" nodeType="tmRoot"/>
+      </p:par>
+    </p:tnLst>
+  </p:timing>
 </p:sld>
 </file>
 
@@ -6227,6 +7349,29 @@
           </a:p>
         </p:txBody>
       </p:sp>
+      <p:sp>
+        <p:nvSpPr>
+          <p:cNvPr id="5" name="Footer Placeholder 4"/>
+          <p:cNvSpPr>
+            <a:spLocks noGrp="1"/>
+          </p:cNvSpPr>
+          <p:nvPr>
+            <p:ph type="ftr" sz="quarter" idx="11"/>
+          </p:nvPr>
+        </p:nvSpPr>
+        <p:spPr/>
+        <p:txBody>
+          <a:bodyPr/>
+          <a:lstStyle/>
+          <a:p>
+            <a:r>
+              <a:rPr lang="en-US" smtClean="0"/>
+              <a:t>Source: Williams, Chapter 5</a:t>
+            </a:r>
+            <a:endParaRPr lang="en-US"/>
+          </a:p>
+        </p:txBody>
+      </p:sp>
     </p:spTree>
     <p:extLst>
       <p:ext uri="{BB962C8B-B14F-4D97-AF65-F5344CB8AC3E}">
@@ -6237,6 +7382,13 @@
   <p:clrMapOvr>
     <a:masterClrMapping/>
   </p:clrMapOvr>
+  <p:timing>
+    <p:tnLst>
+      <p:par>
+        <p:cTn id="1" dur="indefinite" restart="never" nodeType="tmRoot"/>
+      </p:par>
+    </p:tnLst>
+  </p:timing>
 </p:sld>
 </file>
 
@@ -6542,7 +7694,19 @@
               <a:rPr lang="en-US" dirty="0" smtClean="0">
                 <a:cs typeface="Courier New" panose="02070309020205020404" pitchFamily="49" charset="0"/>
               </a:rPr>
-              <a:t>Maybe implemented without locks, </a:t>
+              <a:t>May be </a:t>
+            </a:r>
+            <a:r>
+              <a:rPr lang="en-US" dirty="0" smtClean="0">
+                <a:cs typeface="Courier New" panose="02070309020205020404" pitchFamily="49" charset="0"/>
+              </a:rPr>
+              <a:t>implemented without </a:t>
+            </a:r>
+            <a:r>
+              <a:rPr lang="en-US" dirty="0" smtClean="0">
+                <a:cs typeface="Courier New" panose="02070309020205020404" pitchFamily="49" charset="0"/>
+              </a:rPr>
+              <a:t>locks, </a:t>
             </a:r>
             <a:r>
               <a:rPr lang="en-US" dirty="0" err="1" smtClean="0">
@@ -6579,6 +7743,29 @@
               <a:rPr lang="en-US" smtClean="0"/>
               <a:t>9</a:t>
             </a:fld>
+            <a:endParaRPr lang="en-US"/>
+          </a:p>
+        </p:txBody>
+      </p:sp>
+      <p:sp>
+        <p:nvSpPr>
+          <p:cNvPr id="5" name="Footer Placeholder 4"/>
+          <p:cNvSpPr>
+            <a:spLocks noGrp="1"/>
+          </p:cNvSpPr>
+          <p:nvPr>
+            <p:ph type="ftr" sz="quarter" idx="11"/>
+          </p:nvPr>
+        </p:nvSpPr>
+        <p:spPr/>
+        <p:txBody>
+          <a:bodyPr/>
+          <a:lstStyle/>
+          <a:p>
+            <a:r>
+              <a:rPr lang="en-US" smtClean="0"/>
+              <a:t>Source: Williams, Chapter 5</a:t>
+            </a:r>
             <a:endParaRPr lang="en-US"/>
           </a:p>
         </p:txBody>
@@ -6593,6 +7780,13 @@
   <p:clrMapOvr>
     <a:masterClrMapping/>
   </p:clrMapOvr>
+  <p:timing>
+    <p:tnLst>
+      <p:par>
+        <p:cTn id="1" dur="indefinite" restart="never" nodeType="tmRoot"/>
+      </p:par>
+    </p:tnLst>
+  </p:timing>
 </p:sld>
 </file>
 

</xml_diff>

<commit_message>
Complete atomics lecture and new exit example.
</commit_message>
<xml_diff>
--- a/Lectures/Atomics/Atomics.pptx
+++ b/Lectures/Atomics/Atomics.pptx
@@ -5,7 +5,7 @@
     <p:sldMasterId id="2147483660" r:id="rId1"/>
   </p:sldMasterIdLst>
   <p:notesMasterIdLst>
-    <p:notesMasterId r:id="rId15"/>
+    <p:notesMasterId r:id="rId17"/>
   </p:notesMasterIdLst>
   <p:sldIdLst>
     <p:sldId id="256" r:id="rId2"/>
@@ -21,6 +21,8 @@
     <p:sldId id="267" r:id="rId12"/>
     <p:sldId id="268" r:id="rId13"/>
     <p:sldId id="269" r:id="rId14"/>
+    <p:sldId id="270" r:id="rId15"/>
+    <p:sldId id="271" r:id="rId16"/>
   </p:sldIdLst>
   <p:sldSz cx="9144000" cy="6858000" type="screen4x3"/>
   <p:notesSz cx="6858000" cy="9144000"/>
@@ -204,7 +206,7 @@
           <a:p>
             <a:fld id="{DBE0ECA1-3FBF-48AE-AD2A-4439AE745E19}" type="datetimeFigureOut">
               <a:rPr lang="en-US" smtClean="0"/>
-              <a:t>12/10/2013</a:t>
+              <a:t>12/11/2013</a:t>
             </a:fld>
             <a:endParaRPr lang="en-US"/>
           </a:p>
@@ -665,7 +667,7 @@
           <a:p>
             <a:fld id="{9769DED8-28D4-45B9-A00F-7CFE9335FEA6}" type="datetime1">
               <a:rPr lang="en-US" smtClean="0"/>
-              <a:t>12/10/2013</a:t>
+              <a:t>12/11/2013</a:t>
             </a:fld>
             <a:endParaRPr lang="en-US"/>
           </a:p>
@@ -930,7 +932,7 @@
           <a:p>
             <a:fld id="{2DB3D439-1F88-44B4-B5F7-F9BCD4064257}" type="datetime1">
               <a:rPr lang="en-US" smtClean="0"/>
-              <a:t>12/10/2013</a:t>
+              <a:t>12/11/2013</a:t>
             </a:fld>
             <a:endParaRPr lang="en-US"/>
           </a:p>
@@ -1105,7 +1107,7 @@
           <a:p>
             <a:fld id="{99C5638F-6F55-4055-935C-67841BE78C36}" type="datetime1">
               <a:rPr lang="en-US" smtClean="0"/>
-              <a:t>12/10/2013</a:t>
+              <a:t>12/11/2013</a:t>
             </a:fld>
             <a:endParaRPr lang="en-US"/>
           </a:p>
@@ -1270,7 +1272,7 @@
           <a:p>
             <a:fld id="{E6987D90-0C92-4B22-A29D-FED15412CED2}" type="datetime1">
               <a:rPr lang="en-US" smtClean="0"/>
-              <a:t>12/10/2013</a:t>
+              <a:t>12/11/2013</a:t>
             </a:fld>
             <a:endParaRPr lang="en-US"/>
           </a:p>
@@ -1519,7 +1521,7 @@
           <a:p>
             <a:fld id="{DDB67BC4-9554-49E0-BCB3-D1EF965BA0B8}" type="datetime1">
               <a:rPr lang="en-US" smtClean="0"/>
-              <a:t>12/10/2013</a:t>
+              <a:t>12/11/2013</a:t>
             </a:fld>
             <a:endParaRPr lang="en-US"/>
           </a:p>
@@ -1802,7 +1804,7 @@
           <a:p>
             <a:fld id="{EC24D770-803D-4E01-921C-9C100DD8230C}" type="datetime1">
               <a:rPr lang="en-US" smtClean="0"/>
-              <a:t>12/10/2013</a:t>
+              <a:t>12/11/2013</a:t>
             </a:fld>
             <a:endParaRPr lang="en-US"/>
           </a:p>
@@ -2241,7 +2243,7 @@
           <a:p>
             <a:fld id="{356AD44B-78A4-4209-8070-7DCBE2DC4992}" type="datetime1">
               <a:rPr lang="en-US" smtClean="0"/>
-              <a:t>12/10/2013</a:t>
+              <a:t>12/11/2013</a:t>
             </a:fld>
             <a:endParaRPr lang="en-US"/>
           </a:p>
@@ -2354,7 +2356,7 @@
           <a:p>
             <a:fld id="{A993C59A-7CA2-467F-B7F1-9096881A01B8}" type="datetime1">
               <a:rPr lang="en-US" smtClean="0"/>
-              <a:t>12/10/2013</a:t>
+              <a:t>12/11/2013</a:t>
             </a:fld>
             <a:endParaRPr lang="en-US"/>
           </a:p>
@@ -2444,7 +2446,7 @@
           <a:p>
             <a:fld id="{2B6B58D0-2488-434A-8ED1-692E09B85CC5}" type="datetime1">
               <a:rPr lang="en-US" smtClean="0"/>
-              <a:t>12/10/2013</a:t>
+              <a:t>12/11/2013</a:t>
             </a:fld>
             <a:endParaRPr lang="en-US"/>
           </a:p>
@@ -2686,7 +2688,7 @@
           <a:p>
             <a:fld id="{FDB0AFC2-7D64-4F61-A7B7-9932D3305DDA}" type="datetime1">
               <a:rPr lang="en-US" smtClean="0"/>
-              <a:t>12/10/2013</a:t>
+              <a:t>12/11/2013</a:t>
             </a:fld>
             <a:endParaRPr lang="en-US"/>
           </a:p>
@@ -2980,7 +2982,7 @@
           <a:p>
             <a:fld id="{4983D17A-D7B2-4ECE-8A2C-93679B9D177B}" type="datetime1">
               <a:rPr lang="en-US" smtClean="0"/>
-              <a:t>12/10/2013</a:t>
+              <a:t>12/11/2013</a:t>
             </a:fld>
             <a:endParaRPr lang="en-US"/>
           </a:p>
@@ -3274,7 +3276,7 @@
           <a:p>
             <a:fld id="{2A5275F7-419E-4C23-8A3D-2EE5742B2EC9}" type="datetime1">
               <a:rPr lang="en-US" smtClean="0"/>
-              <a:t>12/10/2013</a:t>
+              <a:t>12/11/2013</a:t>
             </a:fld>
             <a:endParaRPr lang="en-US"/>
           </a:p>
@@ -4911,7 +4913,85 @@
           <a:bodyPr/>
           <a:lstStyle/>
           <a:p>
-            <a:endParaRPr lang="en-US"/>
+            <a:r>
+              <a:rPr lang="en-US" dirty="0" smtClean="0"/>
+              <a:t>Atomic types in C++ allow flexibility</a:t>
+            </a:r>
+          </a:p>
+          <a:p>
+            <a:pPr marL="800100" lvl="1" indent="-342900"/>
+            <a:r>
+              <a:rPr lang="en-US" dirty="0" smtClean="0"/>
+              <a:t>Three memory ordering schemes</a:t>
+            </a:r>
+          </a:p>
+          <a:p>
+            <a:pPr marL="1485900" lvl="2" indent="-342900"/>
+            <a:r>
+              <a:rPr lang="en-US" dirty="0" smtClean="0"/>
+              <a:t>Sequentially consistent ordering (default)</a:t>
+            </a:r>
+          </a:p>
+          <a:p>
+            <a:pPr marL="1485900" lvl="2" indent="-342900"/>
+            <a:r>
+              <a:rPr lang="en-US" dirty="0" smtClean="0"/>
+              <a:t>Acquire-release ordering</a:t>
+            </a:r>
+          </a:p>
+          <a:p>
+            <a:pPr marL="1485900" lvl="2" indent="-342900"/>
+            <a:r>
+              <a:rPr lang="en-US" dirty="0" smtClean="0"/>
+              <a:t>Relaxed ordering</a:t>
+            </a:r>
+          </a:p>
+          <a:p>
+            <a:pPr marL="800100" lvl="1" indent="-342900"/>
+            <a:r>
+              <a:rPr lang="en-US" dirty="0" smtClean="0"/>
+              <a:t>We have been using sequentially consistent ordering</a:t>
+            </a:r>
+          </a:p>
+          <a:p>
+            <a:pPr marL="800100" lvl="1" indent="-342900"/>
+            <a:r>
+              <a:rPr lang="en-US" dirty="0" smtClean="0"/>
+              <a:t>Other ordering schemes are used in lock-free data structures</a:t>
+            </a:r>
+          </a:p>
+          <a:p>
+            <a:pPr marL="342900" indent="-342900"/>
+            <a:r>
+              <a:rPr lang="en-US" dirty="0" smtClean="0">
+                <a:solidFill>
+                  <a:schemeClr val="accent3"/>
+                </a:solidFill>
+              </a:rPr>
+              <a:t>Guideline:</a:t>
+            </a:r>
+          </a:p>
+          <a:p>
+            <a:pPr marL="800100" lvl="1" indent="-342900"/>
+            <a:r>
+              <a:rPr lang="en-US" dirty="0" smtClean="0">
+                <a:solidFill>
+                  <a:schemeClr val="accent3"/>
+                </a:solidFill>
+              </a:rPr>
+              <a:t>Use only sequentially consistent ordering for atomics</a:t>
+            </a:r>
+          </a:p>
+          <a:p>
+            <a:pPr marL="800100" lvl="1" indent="-342900"/>
+            <a:r>
+              <a:rPr lang="en-US" dirty="0" smtClean="0">
+                <a:solidFill>
+                  <a:schemeClr val="accent3"/>
+                </a:solidFill>
+              </a:rPr>
+              <a:t>If you need to use other ordering schemes, become an expert</a:t>
+            </a:r>
           </a:p>
         </p:txBody>
       </p:sp>
@@ -4942,6 +5022,564 @@
     <p:extLst>
       <p:ext uri="{BB962C8B-B14F-4D97-AF65-F5344CB8AC3E}">
         <p14:creationId xmlns:p14="http://schemas.microsoft.com/office/powerpoint/2010/main" val="3229650377"/>
+      </p:ext>
+    </p:extLst>
+  </p:cSld>
+  <p:clrMapOvr>
+    <a:masterClrMapping/>
+  </p:clrMapOvr>
+  <p:timing>
+    <p:tnLst>
+      <p:par>
+        <p:cTn id="1" dur="indefinite" restart="never" nodeType="tmRoot"/>
+      </p:par>
+    </p:tnLst>
+  </p:timing>
+</p:sld>
+</file>
+
+<file path=ppt/slides/slide14.xml><?xml version="1.0" encoding="utf-8"?>
+<p:sld xmlns:a="http://schemas.openxmlformats.org/drawingml/2006/main" xmlns:r="http://schemas.openxmlformats.org/officeDocument/2006/relationships" xmlns:p="http://schemas.openxmlformats.org/presentationml/2006/main">
+  <p:cSld>
+    <p:spTree>
+      <p:nvGrpSpPr>
+        <p:cNvPr id="1" name=""/>
+        <p:cNvGrpSpPr/>
+        <p:nvPr/>
+      </p:nvGrpSpPr>
+      <p:grpSpPr>
+        <a:xfrm>
+          <a:off x="0" y="0"/>
+          <a:ext cx="0" cy="0"/>
+          <a:chOff x="0" y="0"/>
+          <a:chExt cx="0" cy="0"/>
+        </a:xfrm>
+      </p:grpSpPr>
+      <p:sp>
+        <p:nvSpPr>
+          <p:cNvPr id="2" name="Title 1"/>
+          <p:cNvSpPr>
+            <a:spLocks noGrp="1"/>
+          </p:cNvSpPr>
+          <p:nvPr>
+            <p:ph type="title"/>
+          </p:nvPr>
+        </p:nvSpPr>
+        <p:spPr/>
+        <p:txBody>
+          <a:bodyPr/>
+          <a:lstStyle/>
+          <a:p>
+            <a:r>
+              <a:rPr lang="en-US" dirty="0" smtClean="0"/>
+              <a:t>Exit Example</a:t>
+            </a:r>
+            <a:endParaRPr lang="en-US" dirty="0"/>
+          </a:p>
+        </p:txBody>
+      </p:sp>
+      <p:sp>
+        <p:nvSpPr>
+          <p:cNvPr id="3" name="Content Placeholder 2"/>
+          <p:cNvSpPr>
+            <a:spLocks noGrp="1"/>
+          </p:cNvSpPr>
+          <p:nvPr>
+            <p:ph idx="1"/>
+          </p:nvPr>
+        </p:nvSpPr>
+        <p:spPr/>
+        <p:txBody>
+          <a:bodyPr/>
+          <a:lstStyle/>
+          <a:p>
+            <a:r>
+              <a:rPr lang="en-US" dirty="0" smtClean="0"/>
+              <a:t>Let’s visit our exit example again.</a:t>
+            </a:r>
+          </a:p>
+          <a:p>
+            <a:pPr marL="800100" lvl="1" indent="-342900"/>
+            <a:r>
+              <a:rPr lang="en-US" dirty="0" smtClean="0"/>
+              <a:t>We want to avoid the need for a mutex and a condition variable in this case – they are unnecessary.</a:t>
+            </a:r>
+          </a:p>
+          <a:p>
+            <a:pPr marL="800100" lvl="1" indent="-342900"/>
+            <a:r>
+              <a:rPr lang="en-US" dirty="0" smtClean="0"/>
+              <a:t>A </a:t>
+            </a:r>
+            <a:r>
+              <a:rPr lang="en-US" dirty="0" err="1" smtClean="0">
+                <a:latin typeface="Courier New" panose="02070309020205020404" pitchFamily="49" charset="0"/>
+                <a:cs typeface="Courier New" panose="02070309020205020404" pitchFamily="49" charset="0"/>
+              </a:rPr>
+              <a:t>bool</a:t>
+            </a:r>
+            <a:r>
+              <a:rPr lang="en-US" dirty="0" smtClean="0"/>
+              <a:t> does not allow us to tell the compiler about the inter-thread happens-before relationship though.</a:t>
+            </a:r>
+          </a:p>
+          <a:p>
+            <a:pPr marL="800100" lvl="1" indent="-342900"/>
+            <a:r>
+              <a:rPr lang="en-US" dirty="0" smtClean="0"/>
+              <a:t>A </a:t>
+            </a:r>
+            <a:r>
+              <a:rPr lang="en-US" dirty="0" err="1" smtClean="0">
+                <a:latin typeface="Courier New" panose="02070309020205020404" pitchFamily="49" charset="0"/>
+                <a:cs typeface="Courier New" panose="02070309020205020404" pitchFamily="49" charset="0"/>
+              </a:rPr>
+              <a:t>std</a:t>
+            </a:r>
+            <a:r>
+              <a:rPr lang="en-US" dirty="0" smtClean="0">
+                <a:latin typeface="Courier New" panose="02070309020205020404" pitchFamily="49" charset="0"/>
+                <a:cs typeface="Courier New" panose="02070309020205020404" pitchFamily="49" charset="0"/>
+              </a:rPr>
+              <a:t>::atomic&lt;</a:t>
+            </a:r>
+            <a:r>
+              <a:rPr lang="en-US" dirty="0" err="1" smtClean="0">
+                <a:latin typeface="Courier New" panose="02070309020205020404" pitchFamily="49" charset="0"/>
+                <a:cs typeface="Courier New" panose="02070309020205020404" pitchFamily="49" charset="0"/>
+              </a:rPr>
+              <a:t>bool</a:t>
+            </a:r>
+            <a:r>
+              <a:rPr lang="en-US" dirty="0" smtClean="0">
+                <a:latin typeface="Courier New" panose="02070309020205020404" pitchFamily="49" charset="0"/>
+                <a:cs typeface="Courier New" panose="02070309020205020404" pitchFamily="49" charset="0"/>
+              </a:rPr>
+              <a:t>&gt;</a:t>
+            </a:r>
+            <a:r>
+              <a:rPr lang="en-US" dirty="0" smtClean="0"/>
+              <a:t> does allow us to tell the compiler exactly what we want.</a:t>
+            </a:r>
+          </a:p>
+          <a:p>
+            <a:pPr marL="800100" lvl="1" indent="-342900"/>
+            <a:r>
+              <a:rPr lang="en-US" dirty="0" smtClean="0"/>
+              <a:t>Notice the difference between a</a:t>
+            </a:r>
+          </a:p>
+          <a:p>
+            <a:pPr marL="1485900" lvl="2" indent="-342900"/>
+            <a:r>
+              <a:rPr lang="en-US" dirty="0" smtClean="0"/>
+              <a:t>Data race – undefined behavior</a:t>
+            </a:r>
+          </a:p>
+          <a:p>
+            <a:pPr marL="1485900" lvl="2" indent="-342900"/>
+            <a:r>
+              <a:rPr lang="en-US" dirty="0" smtClean="0"/>
+              <a:t>A benign race condition – different number of loops</a:t>
+            </a:r>
+            <a:endParaRPr lang="en-US" dirty="0"/>
+          </a:p>
+        </p:txBody>
+      </p:sp>
+      <p:sp>
+        <p:nvSpPr>
+          <p:cNvPr id="4" name="Slide Number Placeholder 3"/>
+          <p:cNvSpPr>
+            <a:spLocks noGrp="1"/>
+          </p:cNvSpPr>
+          <p:nvPr>
+            <p:ph type="sldNum" sz="quarter" idx="12"/>
+          </p:nvPr>
+        </p:nvSpPr>
+        <p:spPr/>
+        <p:txBody>
+          <a:bodyPr/>
+          <a:lstStyle/>
+          <a:p>
+            <a:fld id="{6DA12B36-9664-4CB0-8B2E-F4A2F44AE97E}" type="slidenum">
+              <a:rPr lang="en-US" smtClean="0"/>
+              <a:t>14</a:t>
+            </a:fld>
+            <a:endParaRPr lang="en-US"/>
+          </a:p>
+        </p:txBody>
+      </p:sp>
+    </p:spTree>
+    <p:extLst>
+      <p:ext uri="{BB962C8B-B14F-4D97-AF65-F5344CB8AC3E}">
+        <p14:creationId xmlns:p14="http://schemas.microsoft.com/office/powerpoint/2010/main" val="1440277742"/>
+      </p:ext>
+    </p:extLst>
+  </p:cSld>
+  <p:clrMapOvr>
+    <a:masterClrMapping/>
+  </p:clrMapOvr>
+  <p:timing>
+    <p:tnLst>
+      <p:par>
+        <p:cTn id="1" dur="indefinite" restart="never" nodeType="tmRoot">
+          <p:childTnLst>
+            <p:seq concurrent="1" nextAc="seek">
+              <p:cTn id="2" dur="indefinite" nodeType="mainSeq">
+                <p:childTnLst>
+                  <p:par>
+                    <p:cTn id="3" fill="hold">
+                      <p:stCondLst>
+                        <p:cond delay="indefinite"/>
+                      </p:stCondLst>
+                      <p:childTnLst>
+                        <p:par>
+                          <p:cTn id="4" fill="hold">
+                            <p:stCondLst>
+                              <p:cond delay="0"/>
+                            </p:stCondLst>
+                            <p:childTnLst>
+                              <p:par>
+                                <p:cTn id="5" presetID="1" presetClass="entr" presetSubtype="0" fill="hold" nodeType="clickEffect">
+                                  <p:stCondLst>
+                                    <p:cond delay="0"/>
+                                  </p:stCondLst>
+                                  <p:childTnLst>
+                                    <p:set>
+                                      <p:cBhvr>
+                                        <p:cTn id="6" dur="1" fill="hold">
+                                          <p:stCondLst>
+                                            <p:cond delay="0"/>
+                                          </p:stCondLst>
+                                        </p:cTn>
+                                        <p:tgtEl>
+                                          <p:spTgt spid="3">
+                                            <p:txEl>
+                                              <p:pRg st="2" end="2"/>
+                                            </p:txEl>
+                                          </p:spTgt>
+                                        </p:tgtEl>
+                                        <p:attrNameLst>
+                                          <p:attrName>style.visibility</p:attrName>
+                                        </p:attrNameLst>
+                                      </p:cBhvr>
+                                      <p:to>
+                                        <p:strVal val="visible"/>
+                                      </p:to>
+                                    </p:set>
+                                  </p:childTnLst>
+                                </p:cTn>
+                              </p:par>
+                            </p:childTnLst>
+                          </p:cTn>
+                        </p:par>
+                      </p:childTnLst>
+                    </p:cTn>
+                  </p:par>
+                  <p:par>
+                    <p:cTn id="7" fill="hold">
+                      <p:stCondLst>
+                        <p:cond delay="indefinite"/>
+                      </p:stCondLst>
+                      <p:childTnLst>
+                        <p:par>
+                          <p:cTn id="8" fill="hold">
+                            <p:stCondLst>
+                              <p:cond delay="0"/>
+                            </p:stCondLst>
+                            <p:childTnLst>
+                              <p:par>
+                                <p:cTn id="9" presetID="1" presetClass="entr" presetSubtype="0" fill="hold" nodeType="clickEffect">
+                                  <p:stCondLst>
+                                    <p:cond delay="0"/>
+                                  </p:stCondLst>
+                                  <p:childTnLst>
+                                    <p:set>
+                                      <p:cBhvr>
+                                        <p:cTn id="10" dur="1" fill="hold">
+                                          <p:stCondLst>
+                                            <p:cond delay="0"/>
+                                          </p:stCondLst>
+                                        </p:cTn>
+                                        <p:tgtEl>
+                                          <p:spTgt spid="3">
+                                            <p:txEl>
+                                              <p:pRg st="3" end="3"/>
+                                            </p:txEl>
+                                          </p:spTgt>
+                                        </p:tgtEl>
+                                        <p:attrNameLst>
+                                          <p:attrName>style.visibility</p:attrName>
+                                        </p:attrNameLst>
+                                      </p:cBhvr>
+                                      <p:to>
+                                        <p:strVal val="visible"/>
+                                      </p:to>
+                                    </p:set>
+                                  </p:childTnLst>
+                                </p:cTn>
+                              </p:par>
+                            </p:childTnLst>
+                          </p:cTn>
+                        </p:par>
+                      </p:childTnLst>
+                    </p:cTn>
+                  </p:par>
+                  <p:par>
+                    <p:cTn id="11" fill="hold">
+                      <p:stCondLst>
+                        <p:cond delay="indefinite"/>
+                      </p:stCondLst>
+                      <p:childTnLst>
+                        <p:par>
+                          <p:cTn id="12" fill="hold">
+                            <p:stCondLst>
+                              <p:cond delay="0"/>
+                            </p:stCondLst>
+                            <p:childTnLst>
+                              <p:par>
+                                <p:cTn id="13" presetID="1" presetClass="entr" presetSubtype="0" fill="hold" nodeType="clickEffect">
+                                  <p:stCondLst>
+                                    <p:cond delay="0"/>
+                                  </p:stCondLst>
+                                  <p:childTnLst>
+                                    <p:set>
+                                      <p:cBhvr>
+                                        <p:cTn id="14" dur="1" fill="hold">
+                                          <p:stCondLst>
+                                            <p:cond delay="0"/>
+                                          </p:stCondLst>
+                                        </p:cTn>
+                                        <p:tgtEl>
+                                          <p:spTgt spid="3">
+                                            <p:txEl>
+                                              <p:pRg st="4" end="4"/>
+                                            </p:txEl>
+                                          </p:spTgt>
+                                        </p:tgtEl>
+                                        <p:attrNameLst>
+                                          <p:attrName>style.visibility</p:attrName>
+                                        </p:attrNameLst>
+                                      </p:cBhvr>
+                                      <p:to>
+                                        <p:strVal val="visible"/>
+                                      </p:to>
+                                    </p:set>
+                                  </p:childTnLst>
+                                </p:cTn>
+                              </p:par>
+                              <p:par>
+                                <p:cTn id="15" presetID="1" presetClass="entr" presetSubtype="0" fill="hold" nodeType="withEffect">
+                                  <p:stCondLst>
+                                    <p:cond delay="0"/>
+                                  </p:stCondLst>
+                                  <p:childTnLst>
+                                    <p:set>
+                                      <p:cBhvr>
+                                        <p:cTn id="16" dur="1" fill="hold">
+                                          <p:stCondLst>
+                                            <p:cond delay="0"/>
+                                          </p:stCondLst>
+                                        </p:cTn>
+                                        <p:tgtEl>
+                                          <p:spTgt spid="3">
+                                            <p:txEl>
+                                              <p:pRg st="5" end="5"/>
+                                            </p:txEl>
+                                          </p:spTgt>
+                                        </p:tgtEl>
+                                        <p:attrNameLst>
+                                          <p:attrName>style.visibility</p:attrName>
+                                        </p:attrNameLst>
+                                      </p:cBhvr>
+                                      <p:to>
+                                        <p:strVal val="visible"/>
+                                      </p:to>
+                                    </p:set>
+                                  </p:childTnLst>
+                                </p:cTn>
+                              </p:par>
+                              <p:par>
+                                <p:cTn id="17" presetID="1" presetClass="entr" presetSubtype="0" fill="hold" nodeType="withEffect">
+                                  <p:stCondLst>
+                                    <p:cond delay="0"/>
+                                  </p:stCondLst>
+                                  <p:childTnLst>
+                                    <p:set>
+                                      <p:cBhvr>
+                                        <p:cTn id="18" dur="1" fill="hold">
+                                          <p:stCondLst>
+                                            <p:cond delay="0"/>
+                                          </p:stCondLst>
+                                        </p:cTn>
+                                        <p:tgtEl>
+                                          <p:spTgt spid="3">
+                                            <p:txEl>
+                                              <p:pRg st="6" end="6"/>
+                                            </p:txEl>
+                                          </p:spTgt>
+                                        </p:tgtEl>
+                                        <p:attrNameLst>
+                                          <p:attrName>style.visibility</p:attrName>
+                                        </p:attrNameLst>
+                                      </p:cBhvr>
+                                      <p:to>
+                                        <p:strVal val="visible"/>
+                                      </p:to>
+                                    </p:set>
+                                  </p:childTnLst>
+                                </p:cTn>
+                              </p:par>
+                            </p:childTnLst>
+                          </p:cTn>
+                        </p:par>
+                      </p:childTnLst>
+                    </p:cTn>
+                  </p:par>
+                </p:childTnLst>
+              </p:cTn>
+              <p:prevCondLst>
+                <p:cond evt="onPrev" delay="0">
+                  <p:tgtEl>
+                    <p:sldTgt/>
+                  </p:tgtEl>
+                </p:cond>
+              </p:prevCondLst>
+              <p:nextCondLst>
+                <p:cond evt="onNext" delay="0">
+                  <p:tgtEl>
+                    <p:sldTgt/>
+                  </p:tgtEl>
+                </p:cond>
+              </p:nextCondLst>
+            </p:seq>
+          </p:childTnLst>
+        </p:cTn>
+      </p:par>
+    </p:tnLst>
+  </p:timing>
+</p:sld>
+</file>
+
+<file path=ppt/slides/slide15.xml><?xml version="1.0" encoding="utf-8"?>
+<p:sld xmlns:a="http://schemas.openxmlformats.org/drawingml/2006/main" xmlns:r="http://schemas.openxmlformats.org/officeDocument/2006/relationships" xmlns:p="http://schemas.openxmlformats.org/presentationml/2006/main">
+  <p:cSld>
+    <p:spTree>
+      <p:nvGrpSpPr>
+        <p:cNvPr id="1" name=""/>
+        <p:cNvGrpSpPr/>
+        <p:nvPr/>
+      </p:nvGrpSpPr>
+      <p:grpSpPr>
+        <a:xfrm>
+          <a:off x="0" y="0"/>
+          <a:ext cx="0" cy="0"/>
+          <a:chOff x="0" y="0"/>
+          <a:chExt cx="0" cy="0"/>
+        </a:xfrm>
+      </p:grpSpPr>
+      <p:sp>
+        <p:nvSpPr>
+          <p:cNvPr id="2" name="Title 1"/>
+          <p:cNvSpPr>
+            <a:spLocks noGrp="1"/>
+          </p:cNvSpPr>
+          <p:nvPr>
+            <p:ph type="title"/>
+          </p:nvPr>
+        </p:nvSpPr>
+        <p:spPr/>
+        <p:txBody>
+          <a:bodyPr/>
+          <a:lstStyle/>
+          <a:p>
+            <a:r>
+              <a:rPr lang="en-US" dirty="0" smtClean="0"/>
+              <a:t>Summary of Guidelines</a:t>
+            </a:r>
+            <a:endParaRPr lang="en-US" dirty="0"/>
+          </a:p>
+        </p:txBody>
+      </p:sp>
+      <p:sp>
+        <p:nvSpPr>
+          <p:cNvPr id="3" name="Content Placeholder 2"/>
+          <p:cNvSpPr>
+            <a:spLocks noGrp="1"/>
+          </p:cNvSpPr>
+          <p:nvPr>
+            <p:ph idx="1"/>
+          </p:nvPr>
+        </p:nvSpPr>
+        <p:spPr/>
+        <p:txBody>
+          <a:bodyPr/>
+          <a:lstStyle/>
+          <a:p>
+            <a:pPr marL="342900" indent="-342900"/>
+            <a:r>
+              <a:rPr lang="en-US" dirty="0">
+                <a:solidFill>
+                  <a:schemeClr val="accent3"/>
+                </a:solidFill>
+              </a:rPr>
+              <a:t>Guideline:</a:t>
+            </a:r>
+          </a:p>
+          <a:p>
+            <a:pPr marL="800100" lvl="1" indent="-342900"/>
+            <a:r>
+              <a:rPr lang="en-US" dirty="0">
+                <a:solidFill>
+                  <a:schemeClr val="accent3"/>
+                </a:solidFill>
+              </a:rPr>
+              <a:t>Use only sequentially consistent ordering for atomics</a:t>
+            </a:r>
+          </a:p>
+          <a:p>
+            <a:pPr marL="800100" lvl="1" indent="-342900"/>
+            <a:r>
+              <a:rPr lang="en-US" dirty="0">
+                <a:solidFill>
+                  <a:schemeClr val="accent3"/>
+                </a:solidFill>
+              </a:rPr>
+              <a:t>If you need to use other ordering schemes, become an expert</a:t>
+            </a:r>
+          </a:p>
+          <a:p>
+            <a:endParaRPr lang="en-US" dirty="0"/>
+          </a:p>
+        </p:txBody>
+      </p:sp>
+      <p:sp>
+        <p:nvSpPr>
+          <p:cNvPr id="4" name="Slide Number Placeholder 3"/>
+          <p:cNvSpPr>
+            <a:spLocks noGrp="1"/>
+          </p:cNvSpPr>
+          <p:nvPr>
+            <p:ph type="sldNum" sz="quarter" idx="12"/>
+          </p:nvPr>
+        </p:nvSpPr>
+        <p:spPr/>
+        <p:txBody>
+          <a:bodyPr/>
+          <a:lstStyle/>
+          <a:p>
+            <a:fld id="{6DA12B36-9664-4CB0-8B2E-F4A2F44AE97E}" type="slidenum">
+              <a:rPr lang="en-US" smtClean="0"/>
+              <a:t>15</a:t>
+            </a:fld>
+            <a:endParaRPr lang="en-US"/>
+          </a:p>
+        </p:txBody>
+      </p:sp>
+    </p:spTree>
+    <p:extLst>
+      <p:ext uri="{BB962C8B-B14F-4D97-AF65-F5344CB8AC3E}">
+        <p14:creationId xmlns:p14="http://schemas.microsoft.com/office/powerpoint/2010/main" val="392072381"/>
       </p:ext>
     </p:extLst>
   </p:cSld>
@@ -7694,19 +8332,7 @@
               <a:rPr lang="en-US" dirty="0" smtClean="0">
                 <a:cs typeface="Courier New" panose="02070309020205020404" pitchFamily="49" charset="0"/>
               </a:rPr>
-              <a:t>May be </a:t>
-            </a:r>
-            <a:r>
-              <a:rPr lang="en-US" dirty="0" smtClean="0">
-                <a:cs typeface="Courier New" panose="02070309020205020404" pitchFamily="49" charset="0"/>
-              </a:rPr>
-              <a:t>implemented without </a:t>
-            </a:r>
-            <a:r>
-              <a:rPr lang="en-US" dirty="0" smtClean="0">
-                <a:cs typeface="Courier New" panose="02070309020205020404" pitchFamily="49" charset="0"/>
-              </a:rPr>
-              <a:t>locks, </a:t>
+              <a:t>May be implemented without locks, </a:t>
             </a:r>
             <a:r>
               <a:rPr lang="en-US" dirty="0" err="1" smtClean="0">

</xml_diff>